<commit_message>
Minor updates to 5510 video08
</commit_message>
<xml_diff>
--- a/clinical-research-methodology/results/video08-sampling.pptx
+++ b/clinical-research-methodology/results/video08-sampling.pptx
@@ -1,11 +1,11 @@
 
 <file path=ppt/presentation.xml><?xml version="1.0" encoding="utf-8"?>
-<p:presentation xmlns:a="http://schemas.openxmlformats.org/drawingml/2006/main" xmlns:r="http://schemas.openxmlformats.org/officeDocument/2006/relationships" xmlns:p="http://schemas.openxmlformats.org/presentationml/2006/main" saveSubsetFonts="1" autoCompressPictures="0">
+<p:presentation xmlns:a="http://schemas.openxmlformats.org/drawingml/2006/main" xmlns:p="http://schemas.openxmlformats.org/presentationml/2006/main" xmlns:r="http://schemas.openxmlformats.org/officeDocument/2006/relationships" autoCompressPictures="0" saveSubsetFonts="1">
   <p:sldMasterIdLst>
     <p:sldMasterId id="2147483648" r:id="rId1"/>
   </p:sldMasterIdLst>
   <p:notesMasterIdLst>
-    <p:NotesMasterId r:id="rId27"/>
+    <p:NotesMasterId r:id="rId36"/>
   </p:notesMasterIdLst>
   <p:sldIdLst>
     <p:sldId id="256" r:id="rId2"/>
@@ -33,6 +33,15 @@
     <p:sldId id="278" r:id="rId24"/>
     <p:sldId id="279" r:id="rId25"/>
     <p:sldId id="280" r:id="rId26"/>
+    <p:sldId id="281" r:id="rId27"/>
+    <p:sldId id="282" r:id="rId28"/>
+    <p:sldId id="283" r:id="rId29"/>
+    <p:sldId id="284" r:id="rId30"/>
+    <p:sldId id="285" r:id="rId31"/>
+    <p:sldId id="286" r:id="rId32"/>
+    <p:sldId id="287" r:id="rId33"/>
+    <p:sldId id="288" r:id="rId34"/>
+    <p:sldId id="289" r:id="rId35"/>
   </p:sldIdLst>
   <p:sldSz cx="9144000" cy="6858000" type="screen4x3"/>
   <p:notesSz cx="6858000" cy="9144000"/>
@@ -40,8 +49,8 @@
     <a:defPPr>
       <a:defRPr lang="en-US"/>
     </a:defPPr>
-    <a:lvl1pPr marL="0" algn="l" defTabSz="457200" rtl="0" eaLnBrk="1" latinLnBrk="0" hangingPunct="1">
-      <a:defRPr sz="1800" kern="1200">
+    <a:lvl1pPr algn="l" defTabSz="457200" eaLnBrk="1" hangingPunct="1" latinLnBrk="0" marL="0" rtl="0">
+      <a:defRPr kern="1200" sz="1800">
         <a:solidFill>
           <a:schemeClr val="tx1"/>
         </a:solidFill>
@@ -50,8 +59,8 @@
         <a:cs typeface="+mn-cs"/>
       </a:defRPr>
     </a:lvl1pPr>
-    <a:lvl2pPr marL="457200" algn="l" defTabSz="457200" rtl="0" eaLnBrk="1" latinLnBrk="0" hangingPunct="1">
-      <a:defRPr sz="1800" kern="1200">
+    <a:lvl2pPr algn="l" defTabSz="457200" eaLnBrk="1" hangingPunct="1" latinLnBrk="0" marL="457200" rtl="0">
+      <a:defRPr kern="1200" sz="1800">
         <a:solidFill>
           <a:schemeClr val="tx1"/>
         </a:solidFill>
@@ -60,8 +69,8 @@
         <a:cs typeface="+mn-cs"/>
       </a:defRPr>
     </a:lvl2pPr>
-    <a:lvl3pPr marL="914400" algn="l" defTabSz="457200" rtl="0" eaLnBrk="1" latinLnBrk="0" hangingPunct="1">
-      <a:defRPr sz="1800" kern="1200">
+    <a:lvl3pPr algn="l" defTabSz="457200" eaLnBrk="1" hangingPunct="1" latinLnBrk="0" marL="914400" rtl="0">
+      <a:defRPr kern="1200" sz="1800">
         <a:solidFill>
           <a:schemeClr val="tx1"/>
         </a:solidFill>
@@ -70,8 +79,8 @@
         <a:cs typeface="+mn-cs"/>
       </a:defRPr>
     </a:lvl3pPr>
-    <a:lvl4pPr marL="1371600" algn="l" defTabSz="457200" rtl="0" eaLnBrk="1" latinLnBrk="0" hangingPunct="1">
-      <a:defRPr sz="1800" kern="1200">
+    <a:lvl4pPr algn="l" defTabSz="457200" eaLnBrk="1" hangingPunct="1" latinLnBrk="0" marL="1371600" rtl="0">
+      <a:defRPr kern="1200" sz="1800">
         <a:solidFill>
           <a:schemeClr val="tx1"/>
         </a:solidFill>
@@ -80,8 +89,8 @@
         <a:cs typeface="+mn-cs"/>
       </a:defRPr>
     </a:lvl4pPr>
-    <a:lvl5pPr marL="1828800" algn="l" defTabSz="457200" rtl="0" eaLnBrk="1" latinLnBrk="0" hangingPunct="1">
-      <a:defRPr sz="1800" kern="1200">
+    <a:lvl5pPr algn="l" defTabSz="457200" eaLnBrk="1" hangingPunct="1" latinLnBrk="0" marL="1828800" rtl="0">
+      <a:defRPr kern="1200" sz="1800">
         <a:solidFill>
           <a:schemeClr val="tx1"/>
         </a:solidFill>
@@ -90,8 +99,8 @@
         <a:cs typeface="+mn-cs"/>
       </a:defRPr>
     </a:lvl5pPr>
-    <a:lvl6pPr marL="2286000" algn="l" defTabSz="457200" rtl="0" eaLnBrk="1" latinLnBrk="0" hangingPunct="1">
-      <a:defRPr sz="1800" kern="1200">
+    <a:lvl6pPr algn="l" defTabSz="457200" eaLnBrk="1" hangingPunct="1" latinLnBrk="0" marL="2286000" rtl="0">
+      <a:defRPr kern="1200" sz="1800">
         <a:solidFill>
           <a:schemeClr val="tx1"/>
         </a:solidFill>
@@ -100,8 +109,8 @@
         <a:cs typeface="+mn-cs"/>
       </a:defRPr>
     </a:lvl6pPr>
-    <a:lvl7pPr marL="2743200" algn="l" defTabSz="457200" rtl="0" eaLnBrk="1" latinLnBrk="0" hangingPunct="1">
-      <a:defRPr sz="1800" kern="1200">
+    <a:lvl7pPr algn="l" defTabSz="457200" eaLnBrk="1" hangingPunct="1" latinLnBrk="0" marL="2743200" rtl="0">
+      <a:defRPr kern="1200" sz="1800">
         <a:solidFill>
           <a:schemeClr val="tx1"/>
         </a:solidFill>
@@ -110,8 +119,8 @@
         <a:cs typeface="+mn-cs"/>
       </a:defRPr>
     </a:lvl7pPr>
-    <a:lvl8pPr marL="3200400" algn="l" defTabSz="457200" rtl="0" eaLnBrk="1" latinLnBrk="0" hangingPunct="1">
-      <a:defRPr sz="1800" kern="1200">
+    <a:lvl8pPr algn="l" defTabSz="457200" eaLnBrk="1" hangingPunct="1" latinLnBrk="0" marL="3200400" rtl="0">
+      <a:defRPr kern="1200" sz="1800">
         <a:solidFill>
           <a:schemeClr val="tx1"/>
         </a:solidFill>
@@ -120,8 +129,8 @@
         <a:cs typeface="+mn-cs"/>
       </a:defRPr>
     </a:lvl8pPr>
-    <a:lvl9pPr marL="3657600" algn="l" defTabSz="457200" rtl="0" eaLnBrk="1" latinLnBrk="0" hangingPunct="1">
-      <a:defRPr sz="1800" kern="1200">
+    <a:lvl9pPr algn="l" defTabSz="457200" eaLnBrk="1" hangingPunct="1" latinLnBrk="0" marL="3657600" rtl="0">
+      <a:defRPr kern="1200" sz="1800">
         <a:solidFill>
           <a:schemeClr val="tx1"/>
         </a:solidFill>
@@ -21079,6 +21088,2384 @@
 </p:notes>
 </file>
 
+<file path=ppt/notesSlides/notesSlide24.xml><?xml version="1.0" encoding="utf-8"?>
+<p:notes xmlns:a="http://schemas.openxmlformats.org/drawingml/2006/main" xmlns:r="http://schemas.openxmlformats.org/officeDocument/2006/relationships" xmlns:p="http://schemas.openxmlformats.org/presentationml/2006/main">
+  <p:cSld>
+    <p:spTree>
+      <p:nvGrpSpPr>
+        <p:cNvPr id="1" name=""/>
+        <p:cNvGrpSpPr/>
+        <p:nvPr/>
+      </p:nvGrpSpPr>
+      <p:grpSpPr>
+        <a:xfrm>
+          <a:off x="0" y="0"/>
+          <a:ext cx="0" cy="0"/>
+          <a:chOff x="0" y="0"/>
+          <a:chExt cx="0" cy="0"/>
+        </a:xfrm>
+      </p:grpSpPr>
+      <p:sp>
+        <p:nvSpPr>
+          <p:cNvPr id="2" name="Slide Image Placeholder 1"/>
+          <p:cNvSpPr>
+            <a:spLocks noGrp="1" noRot="1" noChangeAspect="1"/>
+          </p:cNvSpPr>
+          <p:nvPr>
+            <p:ph type="sldImg"/>
+          </p:nvPr>
+        </p:nvSpPr>
+        <p:spPr/>
+      </p:sp>
+      <p:sp>
+        <p:nvSpPr>
+          <p:cNvPr id="3" name="Notes Placeholder 2"/>
+          <p:cNvSpPr>
+            <a:spLocks noGrp="1"/>
+          </p:cNvSpPr>
+          <p:nvPr>
+            <p:ph type="body" idx="1"/>
+          </p:nvPr>
+        </p:nvSpPr>
+        <p:spPr/>
+        <p:txBody>
+          <a:bodyPr/>
+          <a:lstStyle/>
+          <a:p>
+            <a:pPr lvl="0" marL="0" indent="0">
+              <a:buNone/>
+            </a:pPr>
+            <a:r>
+              <a:rPr/>
+              <a:t>When</a:t>
+            </a:r>
+            <a:r>
+              <a:rPr/>
+              <a:t> </a:t>
+            </a:r>
+            <a:r>
+              <a:rPr/>
+              <a:t>you</a:t>
+            </a:r>
+            <a:r>
+              <a:rPr/>
+              <a:t> </a:t>
+            </a:r>
+            <a:r>
+              <a:rPr/>
+              <a:t>write</a:t>
+            </a:r>
+            <a:r>
+              <a:rPr/>
+              <a:t> </a:t>
+            </a:r>
+            <a:r>
+              <a:rPr/>
+              <a:t>a</a:t>
+            </a:r>
+            <a:r>
+              <a:rPr/>
+              <a:t> </a:t>
+            </a:r>
+            <a:r>
+              <a:rPr/>
+              <a:t>methods</a:t>
+            </a:r>
+            <a:r>
+              <a:rPr/>
+              <a:t> </a:t>
+            </a:r>
+            <a:r>
+              <a:rPr/>
+              <a:t>section,</a:t>
+            </a:r>
+            <a:r>
+              <a:rPr/>
+              <a:t> </a:t>
+            </a:r>
+            <a:r>
+              <a:rPr/>
+              <a:t>keep</a:t>
+            </a:r>
+            <a:r>
+              <a:rPr/>
+              <a:t> </a:t>
+            </a:r>
+            <a:r>
+              <a:rPr/>
+              <a:t>the</a:t>
+            </a:r>
+            <a:r>
+              <a:rPr/>
+              <a:t> </a:t>
+            </a:r>
+            <a:r>
+              <a:rPr/>
+              <a:t>two</a:t>
+            </a:r>
+            <a:r>
+              <a:rPr/>
+              <a:t> </a:t>
+            </a:r>
+            <a:r>
+              <a:rPr/>
+              <a:t>set</a:t>
+            </a:r>
+            <a:r>
+              <a:rPr/>
+              <a:t> </a:t>
+            </a:r>
+            <a:r>
+              <a:rPr/>
+              <a:t>of</a:t>
+            </a:r>
+            <a:r>
+              <a:rPr/>
+              <a:t> </a:t>
+            </a:r>
+            <a:r>
+              <a:rPr/>
+              <a:t>readers</a:t>
+            </a:r>
+            <a:r>
+              <a:rPr/>
+              <a:t> </a:t>
+            </a:r>
+            <a:r>
+              <a:rPr/>
+              <a:t>in</a:t>
+            </a:r>
+            <a:r>
+              <a:rPr/>
+              <a:t> </a:t>
+            </a:r>
+            <a:r>
+              <a:rPr/>
+              <a:t>mind:</a:t>
+            </a:r>
+            <a:r>
+              <a:rPr/>
+              <a:t> </a:t>
+            </a:r>
+            <a:r>
+              <a:rPr/>
+              <a:t>those</a:t>
+            </a:r>
+            <a:r>
+              <a:rPr/>
+              <a:t> </a:t>
+            </a:r>
+            <a:r>
+              <a:rPr/>
+              <a:t>who</a:t>
+            </a:r>
+            <a:r>
+              <a:rPr/>
+              <a:t> </a:t>
+            </a:r>
+            <a:r>
+              <a:rPr/>
+              <a:t>want</a:t>
+            </a:r>
+            <a:r>
+              <a:rPr/>
+              <a:t> </a:t>
+            </a:r>
+            <a:r>
+              <a:rPr/>
+              <a:t>to</a:t>
+            </a:r>
+            <a:r>
+              <a:rPr/>
+              <a:t> </a:t>
+            </a:r>
+            <a:r>
+              <a:rPr/>
+              <a:t>evaluate</a:t>
+            </a:r>
+            <a:r>
+              <a:rPr/>
+              <a:t> </a:t>
+            </a:r>
+            <a:r>
+              <a:rPr/>
+              <a:t>your</a:t>
+            </a:r>
+            <a:r>
+              <a:rPr/>
+              <a:t> </a:t>
+            </a:r>
+            <a:r>
+              <a:rPr/>
+              <a:t>research</a:t>
+            </a:r>
+            <a:r>
+              <a:rPr/>
+              <a:t> </a:t>
+            </a:r>
+            <a:r>
+              <a:rPr/>
+              <a:t>and</a:t>
+            </a:r>
+            <a:r>
+              <a:rPr/>
+              <a:t> </a:t>
+            </a:r>
+            <a:r>
+              <a:rPr/>
+              <a:t>those</a:t>
+            </a:r>
+            <a:r>
+              <a:rPr/>
+              <a:t> </a:t>
+            </a:r>
+            <a:r>
+              <a:rPr/>
+              <a:t>who</a:t>
+            </a:r>
+            <a:r>
+              <a:rPr/>
+              <a:t> </a:t>
+            </a:r>
+            <a:r>
+              <a:rPr/>
+              <a:t>want</a:t>
+            </a:r>
+            <a:r>
+              <a:rPr/>
+              <a:t> </a:t>
+            </a:r>
+            <a:r>
+              <a:rPr/>
+              <a:t>to</a:t>
+            </a:r>
+            <a:r>
+              <a:rPr/>
+              <a:t> </a:t>
+            </a:r>
+            <a:r>
+              <a:rPr/>
+              <a:t>use</a:t>
+            </a:r>
+            <a:r>
+              <a:rPr/>
+              <a:t> </a:t>
+            </a:r>
+            <a:r>
+              <a:rPr/>
+              <a:t>your</a:t>
+            </a:r>
+            <a:r>
+              <a:rPr/>
+              <a:t> </a:t>
+            </a:r>
+            <a:r>
+              <a:rPr/>
+              <a:t>research</a:t>
+            </a:r>
+            <a:r>
+              <a:rPr/>
+              <a:t> </a:t>
+            </a:r>
+            <a:r>
+              <a:rPr/>
+              <a:t>as</a:t>
+            </a:r>
+            <a:r>
+              <a:rPr/>
+              <a:t> </a:t>
+            </a:r>
+            <a:r>
+              <a:rPr/>
+              <a:t>a</a:t>
+            </a:r>
+            <a:r>
+              <a:rPr/>
+              <a:t> </a:t>
+            </a:r>
+            <a:r>
+              <a:rPr/>
+              <a:t>model</a:t>
+            </a:r>
+            <a:r>
+              <a:rPr/>
+              <a:t> </a:t>
+            </a:r>
+            <a:r>
+              <a:rPr/>
+              <a:t>for</a:t>
+            </a:r>
+            <a:r>
+              <a:rPr/>
+              <a:t> </a:t>
+            </a:r>
+            <a:r>
+              <a:rPr/>
+              <a:t>their</a:t>
+            </a:r>
+            <a:r>
+              <a:rPr/>
+              <a:t> </a:t>
+            </a:r>
+            <a:r>
+              <a:rPr/>
+              <a:t>own</a:t>
+            </a:r>
+            <a:r>
+              <a:rPr/>
+              <a:t> </a:t>
+            </a:r>
+            <a:r>
+              <a:rPr/>
+              <a:t>replication</a:t>
+            </a:r>
+            <a:r>
+              <a:rPr/>
+              <a:t> </a:t>
+            </a:r>
+            <a:r>
+              <a:rPr/>
+              <a:t>or</a:t>
+            </a:r>
+            <a:r>
+              <a:rPr/>
+              <a:t> </a:t>
+            </a:r>
+            <a:r>
+              <a:rPr/>
+              <a:t>extension</a:t>
+            </a:r>
+            <a:r>
+              <a:rPr/>
+              <a:t> </a:t>
+            </a:r>
+            <a:r>
+              <a:rPr/>
+              <a:t>of</a:t>
+            </a:r>
+            <a:r>
+              <a:rPr/>
+              <a:t> </a:t>
+            </a:r>
+            <a:r>
+              <a:rPr/>
+              <a:t>your</a:t>
+            </a:r>
+            <a:r>
+              <a:rPr/>
+              <a:t> </a:t>
+            </a:r>
+            <a:r>
+              <a:rPr/>
+              <a:t>work.</a:t>
+            </a:r>
+          </a:p>
+        </p:txBody>
+      </p:sp>
+      <p:sp>
+        <p:nvSpPr>
+          <p:cNvPr id="4" name="Slide Number Placeholder 3"/>
+          <p:cNvSpPr>
+            <a:spLocks noGrp="1"/>
+          </p:cNvSpPr>
+          <p:nvPr>
+            <p:ph type="sldNum" sz="quarter" idx="10"/>
+          </p:nvPr>
+        </p:nvSpPr>
+        <p:spPr/>
+        <p:txBody>
+          <a:bodyPr/>
+          <a:lstStyle/>
+          <a:p>
+            <a:fld id="{18BDFEC3-8487-43E8-A154-7C12CBC1FFF2}" type="slidenum">
+              <a:rPr lang="en-US"/>
+              <a:t>25</a:t>
+            </a:fld>
+            <a:endParaRPr lang="en-US"/>
+          </a:p>
+        </p:txBody>
+      </p:sp>
+    </p:spTree>
+  </p:cSld>
+</p:notes>
+</file>
+
+<file path=ppt/notesSlides/notesSlide25.xml><?xml version="1.0" encoding="utf-8"?>
+<p:notes xmlns:a="http://schemas.openxmlformats.org/drawingml/2006/main" xmlns:r="http://schemas.openxmlformats.org/officeDocument/2006/relationships" xmlns:p="http://schemas.openxmlformats.org/presentationml/2006/main">
+  <p:cSld>
+    <p:spTree>
+      <p:nvGrpSpPr>
+        <p:cNvPr id="1" name=""/>
+        <p:cNvGrpSpPr/>
+        <p:nvPr/>
+      </p:nvGrpSpPr>
+      <p:grpSpPr>
+        <a:xfrm>
+          <a:off x="0" y="0"/>
+          <a:ext cx="0" cy="0"/>
+          <a:chOff x="0" y="0"/>
+          <a:chExt cx="0" cy="0"/>
+        </a:xfrm>
+      </p:grpSpPr>
+      <p:sp>
+        <p:nvSpPr>
+          <p:cNvPr id="2" name="Slide Image Placeholder 1"/>
+          <p:cNvSpPr>
+            <a:spLocks noGrp="1" noRot="1" noChangeAspect="1"/>
+          </p:cNvSpPr>
+          <p:nvPr>
+            <p:ph type="sldImg"/>
+          </p:nvPr>
+        </p:nvSpPr>
+        <p:spPr/>
+      </p:sp>
+      <p:sp>
+        <p:nvSpPr>
+          <p:cNvPr id="3" name="Notes Placeholder 2"/>
+          <p:cNvSpPr>
+            <a:spLocks noGrp="1"/>
+          </p:cNvSpPr>
+          <p:nvPr>
+            <p:ph type="body" idx="1"/>
+          </p:nvPr>
+        </p:nvSpPr>
+        <p:spPr/>
+        <p:txBody>
+          <a:bodyPr/>
+          <a:lstStyle/>
+          <a:p>
+            <a:pPr lvl="0" marL="0" indent="0">
+              <a:buNone/>
+            </a:pPr>
+            <a:r>
+              <a:rPr/>
+              <a:t>There</a:t>
+            </a:r>
+            <a:r>
+              <a:rPr/>
+              <a:t> </a:t>
+            </a:r>
+            <a:r>
+              <a:rPr/>
+              <a:t>is</a:t>
+            </a:r>
+            <a:r>
+              <a:rPr/>
+              <a:t> </a:t>
+            </a:r>
+            <a:r>
+              <a:rPr/>
+              <a:t>a</a:t>
+            </a:r>
+            <a:r>
+              <a:rPr/>
+              <a:t> </a:t>
+            </a:r>
+            <a:r>
+              <a:rPr/>
+              <a:t>sharp</a:t>
+            </a:r>
+            <a:r>
+              <a:rPr/>
+              <a:t> </a:t>
+            </a:r>
+            <a:r>
+              <a:rPr/>
+              <a:t>dividing</a:t>
+            </a:r>
+            <a:r>
+              <a:rPr/>
+              <a:t> </a:t>
+            </a:r>
+            <a:r>
+              <a:rPr/>
+              <a:t>line,</a:t>
+            </a:r>
+            <a:r>
+              <a:rPr/>
+              <a:t> </a:t>
+            </a:r>
+            <a:r>
+              <a:rPr/>
+              <a:t>according</a:t>
+            </a:r>
+            <a:r>
+              <a:rPr/>
+              <a:t> </a:t>
+            </a:r>
+            <a:r>
+              <a:rPr/>
+              <a:t>to</a:t>
+            </a:r>
+            <a:r>
+              <a:rPr/>
+              <a:t> </a:t>
+            </a:r>
+            <a:r>
+              <a:rPr/>
+              <a:t>some,</a:t>
+            </a:r>
+            <a:r>
+              <a:rPr/>
+              <a:t> </a:t>
+            </a:r>
+            <a:r>
+              <a:rPr/>
+              <a:t>about</a:t>
+            </a:r>
+            <a:r>
+              <a:rPr/>
+              <a:t> </a:t>
+            </a:r>
+            <a:r>
+              <a:rPr/>
+              <a:t>what</a:t>
+            </a:r>
+            <a:r>
+              <a:rPr/>
+              <a:t> </a:t>
+            </a:r>
+            <a:r>
+              <a:rPr/>
+              <a:t>goes</a:t>
+            </a:r>
+            <a:r>
+              <a:rPr/>
+              <a:t> </a:t>
+            </a:r>
+            <a:r>
+              <a:rPr/>
+              <a:t>in</a:t>
+            </a:r>
+            <a:r>
+              <a:rPr/>
+              <a:t> </a:t>
+            </a:r>
+            <a:r>
+              <a:rPr/>
+              <a:t>methods</a:t>
+            </a:r>
+            <a:r>
+              <a:rPr/>
+              <a:t> </a:t>
+            </a:r>
+            <a:r>
+              <a:rPr/>
+              <a:t>and</a:t>
+            </a:r>
+            <a:r>
+              <a:rPr/>
+              <a:t> </a:t>
+            </a:r>
+            <a:r>
+              <a:rPr/>
+              <a:t>what</a:t>
+            </a:r>
+            <a:r>
+              <a:rPr/>
+              <a:t> </a:t>
+            </a:r>
+            <a:r>
+              <a:rPr/>
+              <a:t>does</a:t>
+            </a:r>
+            <a:r>
+              <a:rPr/>
+              <a:t> </a:t>
+            </a:r>
+            <a:r>
+              <a:rPr/>
+              <a:t>in</a:t>
+            </a:r>
+            <a:r>
+              <a:rPr/>
+              <a:t> </a:t>
+            </a:r>
+            <a:r>
+              <a:rPr/>
+              <a:t>the</a:t>
+            </a:r>
+            <a:r>
+              <a:rPr/>
+              <a:t> </a:t>
+            </a:r>
+            <a:r>
+              <a:rPr/>
+              <a:t>results</a:t>
+            </a:r>
+            <a:r>
+              <a:rPr/>
+              <a:t> </a:t>
+            </a:r>
+            <a:r>
+              <a:rPr/>
+              <a:t>section.</a:t>
+            </a:r>
+          </a:p>
+          <a:p>
+            <a:pPr lvl="0" marL="0" indent="0">
+              <a:buNone/>
+            </a:pPr>
+          </a:p>
+          <a:p>
+            <a:pPr lvl="0" marL="0" indent="0">
+              <a:buNone/>
+            </a:pPr>
+            <a:r>
+              <a:rPr/>
+              <a:t>some</a:t>
+            </a:r>
+            <a:r>
+              <a:rPr/>
+              <a:t> </a:t>
+            </a:r>
+            <a:r>
+              <a:rPr/>
+              <a:t>people</a:t>
+            </a:r>
+            <a:r>
+              <a:rPr/>
+              <a:t> </a:t>
+            </a:r>
+            <a:r>
+              <a:rPr/>
+              <a:t>will</a:t>
+            </a:r>
+            <a:r>
+              <a:rPr/>
+              <a:t> </a:t>
+            </a:r>
+            <a:r>
+              <a:rPr/>
+              <a:t>put</a:t>
+            </a:r>
+            <a:r>
+              <a:rPr/>
+              <a:t> </a:t>
+            </a:r>
+            <a:r>
+              <a:rPr/>
+              <a:t>a</a:t>
+            </a:r>
+            <a:r>
+              <a:rPr/>
+              <a:t> </a:t>
+            </a:r>
+            <a:r>
+              <a:rPr/>
+              <a:t>few</a:t>
+            </a:r>
+            <a:r>
+              <a:rPr/>
+              <a:t> </a:t>
+            </a:r>
+            <a:r>
+              <a:rPr/>
+              <a:t>details</a:t>
+            </a:r>
+            <a:r>
+              <a:rPr/>
+              <a:t> </a:t>
+            </a:r>
+            <a:r>
+              <a:rPr/>
+              <a:t>like</a:t>
+            </a:r>
+            <a:r>
+              <a:rPr/>
+              <a:t> </a:t>
+            </a:r>
+            <a:r>
+              <a:rPr/>
+              <a:t>patient</a:t>
+            </a:r>
+            <a:r>
+              <a:rPr/>
+              <a:t> </a:t>
+            </a:r>
+            <a:r>
+              <a:rPr/>
+              <a:t>counts</a:t>
+            </a:r>
+            <a:r>
+              <a:rPr/>
+              <a:t> </a:t>
+            </a:r>
+            <a:r>
+              <a:rPr/>
+              <a:t>and</a:t>
+            </a:r>
+            <a:r>
+              <a:rPr/>
+              <a:t> </a:t>
+            </a:r>
+            <a:r>
+              <a:rPr/>
+              <a:t>dropout</a:t>
+            </a:r>
+            <a:r>
+              <a:rPr/>
+              <a:t> </a:t>
+            </a:r>
+            <a:r>
+              <a:rPr/>
+              <a:t>ratesin</a:t>
+            </a:r>
+            <a:r>
+              <a:rPr/>
+              <a:t> </a:t>
+            </a:r>
+            <a:r>
+              <a:rPr/>
+              <a:t>the</a:t>
+            </a:r>
+            <a:r>
+              <a:rPr/>
+              <a:t> </a:t>
+            </a:r>
+            <a:r>
+              <a:rPr/>
+              <a:t>methods</a:t>
+            </a:r>
+            <a:r>
+              <a:rPr/>
+              <a:t> </a:t>
+            </a:r>
+            <a:r>
+              <a:rPr/>
+              <a:t>section,</a:t>
+            </a:r>
+            <a:r>
+              <a:rPr/>
+              <a:t> </a:t>
+            </a:r>
+            <a:r>
+              <a:rPr/>
+              <a:t>but</a:t>
+            </a:r>
+            <a:r>
+              <a:rPr/>
+              <a:t> </a:t>
+            </a:r>
+            <a:r>
+              <a:rPr/>
+              <a:t>in</a:t>
+            </a:r>
+            <a:r>
+              <a:rPr/>
+              <a:t> </a:t>
+            </a:r>
+            <a:r>
+              <a:rPr/>
+              <a:t>general,</a:t>
+            </a:r>
+            <a:r>
+              <a:rPr/>
+              <a:t> </a:t>
+            </a:r>
+            <a:r>
+              <a:rPr/>
+              <a:t>you</a:t>
+            </a:r>
+            <a:r>
+              <a:rPr/>
+              <a:t> </a:t>
+            </a:r>
+            <a:r>
+              <a:rPr/>
+              <a:t>should</a:t>
+            </a:r>
+            <a:r>
+              <a:rPr/>
+              <a:t> </a:t>
+            </a:r>
+            <a:r>
+              <a:rPr/>
+              <a:t>only</a:t>
+            </a:r>
+            <a:r>
+              <a:rPr/>
+              <a:t> </a:t>
+            </a:r>
+            <a:r>
+              <a:rPr/>
+              <a:t>put</a:t>
+            </a:r>
+            <a:r>
+              <a:rPr/>
+              <a:t> </a:t>
+            </a:r>
+            <a:r>
+              <a:rPr/>
+              <a:t>information</a:t>
+            </a:r>
+            <a:r>
+              <a:rPr/>
+              <a:t> </a:t>
+            </a:r>
+            <a:r>
+              <a:rPr/>
+              <a:t>in</a:t>
+            </a:r>
+            <a:r>
+              <a:rPr/>
+              <a:t> </a:t>
+            </a:r>
+            <a:r>
+              <a:rPr/>
+              <a:t>methods</a:t>
+            </a:r>
+            <a:r>
+              <a:rPr/>
+              <a:t> </a:t>
+            </a:r>
+            <a:r>
+              <a:rPr/>
+              <a:t>if</a:t>
+            </a:r>
+            <a:r>
+              <a:rPr/>
+              <a:t> </a:t>
+            </a:r>
+            <a:r>
+              <a:rPr/>
+              <a:t>it</a:t>
+            </a:r>
+            <a:r>
+              <a:rPr/>
+              <a:t> </a:t>
+            </a:r>
+            <a:r>
+              <a:rPr/>
+              <a:t>was</a:t>
+            </a:r>
+            <a:r>
+              <a:rPr/>
+              <a:t> </a:t>
+            </a:r>
+            <a:r>
+              <a:rPr/>
+              <a:t>known</a:t>
+            </a:r>
+            <a:r>
+              <a:rPr/>
+              <a:t> </a:t>
+            </a:r>
+            <a:r>
+              <a:rPr/>
+              <a:t>prior</a:t>
+            </a:r>
+            <a:r>
+              <a:rPr/>
+              <a:t> </a:t>
+            </a:r>
+            <a:r>
+              <a:rPr/>
+              <a:t>to</a:t>
+            </a:r>
+            <a:r>
+              <a:rPr/>
+              <a:t> </a:t>
+            </a:r>
+            <a:r>
+              <a:rPr/>
+              <a:t>data</a:t>
+            </a:r>
+            <a:r>
+              <a:rPr/>
+              <a:t> </a:t>
+            </a:r>
+            <a:r>
+              <a:rPr/>
+              <a:t>collection.</a:t>
+            </a:r>
+            <a:r>
+              <a:rPr/>
+              <a:t> </a:t>
+            </a:r>
+            <a:r>
+              <a:rPr/>
+              <a:t>The</a:t>
+            </a:r>
+            <a:r>
+              <a:rPr/>
+              <a:t> </a:t>
+            </a:r>
+            <a:r>
+              <a:rPr/>
+              <a:t>one</a:t>
+            </a:r>
+            <a:r>
+              <a:rPr/>
+              <a:t> </a:t>
+            </a:r>
+            <a:r>
+              <a:rPr/>
+              <a:t>exception,</a:t>
+            </a:r>
+            <a:r>
+              <a:rPr/>
+              <a:t> </a:t>
+            </a:r>
+            <a:r>
+              <a:rPr/>
+              <a:t>perhaps,</a:t>
+            </a:r>
+            <a:r>
+              <a:rPr/>
+              <a:t> </a:t>
+            </a:r>
+            <a:r>
+              <a:rPr/>
+              <a:t>would</a:t>
+            </a:r>
+            <a:r>
+              <a:rPr/>
+              <a:t> </a:t>
+            </a:r>
+            <a:r>
+              <a:rPr/>
+              <a:t>be</a:t>
+            </a:r>
+            <a:r>
+              <a:rPr/>
+              <a:t> </a:t>
+            </a:r>
+            <a:r>
+              <a:rPr/>
+              <a:t>changes</a:t>
+            </a:r>
+            <a:r>
+              <a:rPr/>
+              <a:t> </a:t>
+            </a:r>
+            <a:r>
+              <a:rPr/>
+              <a:t>in</a:t>
+            </a:r>
+            <a:r>
+              <a:rPr/>
+              <a:t> </a:t>
+            </a:r>
+            <a:r>
+              <a:rPr/>
+              <a:t>the</a:t>
+            </a:r>
+            <a:r>
+              <a:rPr/>
+              <a:t> </a:t>
+            </a:r>
+            <a:r>
+              <a:rPr/>
+              <a:t>protocol</a:t>
+            </a:r>
+            <a:r>
+              <a:rPr/>
+              <a:t> </a:t>
+            </a:r>
+            <a:r>
+              <a:rPr/>
+              <a:t>that</a:t>
+            </a:r>
+            <a:r>
+              <a:rPr/>
+              <a:t> </a:t>
+            </a:r>
+            <a:r>
+              <a:rPr/>
+              <a:t>occur</a:t>
+            </a:r>
+            <a:r>
+              <a:rPr/>
+              <a:t> </a:t>
+            </a:r>
+            <a:r>
+              <a:rPr/>
+              <a:t>during</a:t>
+            </a:r>
+            <a:r>
+              <a:rPr/>
+              <a:t> </a:t>
+            </a:r>
+            <a:r>
+              <a:rPr/>
+              <a:t>the</a:t>
+            </a:r>
+            <a:r>
+              <a:rPr/>
+              <a:t> </a:t>
+            </a:r>
+            <a:r>
+              <a:rPr/>
+              <a:t>study.</a:t>
+            </a:r>
+            <a:r>
+              <a:rPr/>
+              <a:t> </a:t>
+            </a:r>
+            <a:r>
+              <a:rPr/>
+              <a:t>Ideally,</a:t>
+            </a:r>
+            <a:r>
+              <a:rPr/>
+              <a:t> </a:t>
+            </a:r>
+            <a:r>
+              <a:rPr/>
+              <a:t>you</a:t>
+            </a:r>
+            <a:r>
+              <a:rPr/>
+              <a:t> </a:t>
+            </a:r>
+            <a:r>
+              <a:rPr/>
+              <a:t>do</a:t>
+            </a:r>
+            <a:r>
+              <a:rPr/>
+              <a:t> </a:t>
+            </a:r>
+            <a:r>
+              <a:rPr/>
+              <a:t>not</a:t>
+            </a:r>
+            <a:r>
+              <a:rPr/>
+              <a:t> </a:t>
+            </a:r>
+            <a:r>
+              <a:rPr/>
+              <a:t>have</a:t>
+            </a:r>
+            <a:r>
+              <a:rPr/>
+              <a:t> </a:t>
+            </a:r>
+            <a:r>
+              <a:rPr/>
+              <a:t>this,</a:t>
+            </a:r>
+            <a:r>
+              <a:rPr/>
+              <a:t> </a:t>
+            </a:r>
+            <a:r>
+              <a:rPr/>
+              <a:t>but</a:t>
+            </a:r>
+            <a:r>
+              <a:rPr/>
+              <a:t> </a:t>
+            </a:r>
+            <a:r>
+              <a:rPr/>
+              <a:t>it</a:t>
+            </a:r>
+            <a:r>
+              <a:rPr/>
+              <a:t> </a:t>
+            </a:r>
+            <a:r>
+              <a:rPr/>
+              <a:t>happens</a:t>
+            </a:r>
+            <a:r>
+              <a:rPr/>
+              <a:t> </a:t>
+            </a:r>
+            <a:r>
+              <a:rPr/>
+              <a:t>and</a:t>
+            </a:r>
+            <a:r>
+              <a:rPr/>
+              <a:t> </a:t>
+            </a:r>
+            <a:r>
+              <a:rPr/>
+              <a:t>you</a:t>
+            </a:r>
+            <a:r>
+              <a:rPr/>
+              <a:t> </a:t>
+            </a:r>
+            <a:r>
+              <a:rPr/>
+              <a:t>must</a:t>
+            </a:r>
+            <a:r>
+              <a:rPr/>
+              <a:t> </a:t>
+            </a:r>
+            <a:r>
+              <a:rPr/>
+              <a:t>document</a:t>
+            </a:r>
+            <a:r>
+              <a:rPr/>
+              <a:t> </a:t>
+            </a:r>
+            <a:r>
+              <a:rPr/>
+              <a:t>these</a:t>
+            </a:r>
+            <a:r>
+              <a:rPr/>
+              <a:t> </a:t>
+            </a:r>
+            <a:r>
+              <a:rPr/>
+              <a:t>changes.</a:t>
+            </a:r>
+          </a:p>
+        </p:txBody>
+      </p:sp>
+      <p:sp>
+        <p:nvSpPr>
+          <p:cNvPr id="4" name="Slide Number Placeholder 3"/>
+          <p:cNvSpPr>
+            <a:spLocks noGrp="1"/>
+          </p:cNvSpPr>
+          <p:nvPr>
+            <p:ph type="sldNum" sz="quarter" idx="10"/>
+          </p:nvPr>
+        </p:nvSpPr>
+        <p:spPr/>
+        <p:txBody>
+          <a:bodyPr/>
+          <a:lstStyle/>
+          <a:p>
+            <a:fld id="{18BDFEC3-8487-43E8-A154-7C12CBC1FFF2}" type="slidenum">
+              <a:rPr lang="en-US"/>
+              <a:t>26</a:t>
+            </a:fld>
+            <a:endParaRPr lang="en-US"/>
+          </a:p>
+        </p:txBody>
+      </p:sp>
+    </p:spTree>
+  </p:cSld>
+</p:notes>
+</file>
+
+<file path=ppt/notesSlides/notesSlide26.xml><?xml version="1.0" encoding="utf-8"?>
+<p:notes xmlns:a="http://schemas.openxmlformats.org/drawingml/2006/main" xmlns:r="http://schemas.openxmlformats.org/officeDocument/2006/relationships" xmlns:p="http://schemas.openxmlformats.org/presentationml/2006/main">
+  <p:cSld>
+    <p:spTree>
+      <p:nvGrpSpPr>
+        <p:cNvPr id="1" name=""/>
+        <p:cNvGrpSpPr/>
+        <p:nvPr/>
+      </p:nvGrpSpPr>
+      <p:grpSpPr>
+        <a:xfrm>
+          <a:off x="0" y="0"/>
+          <a:ext cx="0" cy="0"/>
+          <a:chOff x="0" y="0"/>
+          <a:chExt cx="0" cy="0"/>
+        </a:xfrm>
+      </p:grpSpPr>
+      <p:sp>
+        <p:nvSpPr>
+          <p:cNvPr id="2" name="Slide Image Placeholder 1"/>
+          <p:cNvSpPr>
+            <a:spLocks noGrp="1" noRot="1" noChangeAspect="1"/>
+          </p:cNvSpPr>
+          <p:nvPr>
+            <p:ph type="sldImg"/>
+          </p:nvPr>
+        </p:nvSpPr>
+        <p:spPr/>
+      </p:sp>
+      <p:sp>
+        <p:nvSpPr>
+          <p:cNvPr id="3" name="Notes Placeholder 2"/>
+          <p:cNvSpPr>
+            <a:spLocks noGrp="1"/>
+          </p:cNvSpPr>
+          <p:nvPr>
+            <p:ph type="body" idx="1"/>
+          </p:nvPr>
+        </p:nvSpPr>
+        <p:spPr/>
+        <p:txBody>
+          <a:bodyPr/>
+          <a:lstStyle/>
+          <a:p>
+            <a:pPr lvl="0" marL="0" indent="0">
+              <a:buNone/>
+            </a:pPr>
+            <a:r>
+              <a:rPr/>
+              <a:t>There</a:t>
+            </a:r>
+            <a:r>
+              <a:rPr/>
+              <a:t> </a:t>
+            </a:r>
+            <a:r>
+              <a:rPr/>
+              <a:t>is</a:t>
+            </a:r>
+            <a:r>
+              <a:rPr/>
+              <a:t> </a:t>
+            </a:r>
+            <a:r>
+              <a:rPr/>
+              <a:t>no</a:t>
+            </a:r>
+            <a:r>
+              <a:rPr/>
+              <a:t> </a:t>
+            </a:r>
+            <a:r>
+              <a:rPr/>
+              <a:t>consensus</a:t>
+            </a:r>
+            <a:r>
+              <a:rPr/>
+              <a:t> </a:t>
+            </a:r>
+            <a:r>
+              <a:rPr/>
+              <a:t>on</a:t>
+            </a:r>
+            <a:r>
+              <a:rPr/>
+              <a:t> </a:t>
+            </a:r>
+            <a:r>
+              <a:rPr/>
+              <a:t>the</a:t>
+            </a:r>
+            <a:r>
+              <a:rPr/>
+              <a:t> </a:t>
+            </a:r>
+            <a:r>
+              <a:rPr/>
+              <a:t>organization</a:t>
+            </a:r>
+            <a:r>
+              <a:rPr/>
+              <a:t> </a:t>
+            </a:r>
+            <a:r>
+              <a:rPr/>
+              <a:t>of</a:t>
+            </a:r>
+            <a:r>
+              <a:rPr/>
+              <a:t> </a:t>
+            </a:r>
+            <a:r>
+              <a:rPr/>
+              <a:t>material</a:t>
+            </a:r>
+            <a:r>
+              <a:rPr/>
+              <a:t> </a:t>
+            </a:r>
+            <a:r>
+              <a:rPr/>
+              <a:t>in</a:t>
+            </a:r>
+            <a:r>
+              <a:rPr/>
+              <a:t> </a:t>
+            </a:r>
+            <a:r>
+              <a:rPr/>
+              <a:t>a</a:t>
+            </a:r>
+            <a:r>
+              <a:rPr/>
+              <a:t> </a:t>
+            </a:r>
+            <a:r>
+              <a:rPr/>
+              <a:t>methods</a:t>
+            </a:r>
+            <a:r>
+              <a:rPr/>
+              <a:t> </a:t>
+            </a:r>
+            <a:r>
+              <a:rPr/>
+              <a:t>section.</a:t>
+            </a:r>
+            <a:r>
+              <a:rPr/>
+              <a:t> </a:t>
+            </a:r>
+            <a:r>
+              <a:rPr/>
+              <a:t>Here</a:t>
+            </a:r>
+            <a:r>
+              <a:rPr/>
+              <a:t> </a:t>
+            </a:r>
+            <a:r>
+              <a:rPr/>
+              <a:t>is</a:t>
+            </a:r>
+            <a:r>
+              <a:rPr/>
+              <a:t> </a:t>
+            </a:r>
+            <a:r>
+              <a:rPr/>
+              <a:t>one</a:t>
+            </a:r>
+            <a:r>
+              <a:rPr/>
+              <a:t> </a:t>
+            </a:r>
+            <a:r>
+              <a:rPr/>
+              <a:t>strucure</a:t>
+            </a:r>
+            <a:r>
+              <a:rPr/>
+              <a:t> </a:t>
+            </a:r>
+            <a:r>
+              <a:rPr/>
+              <a:t>that</a:t>
+            </a:r>
+            <a:r>
+              <a:rPr/>
+              <a:t> </a:t>
+            </a:r>
+            <a:r>
+              <a:rPr/>
+              <a:t>I</a:t>
+            </a:r>
+            <a:r>
+              <a:rPr/>
+              <a:t> </a:t>
+            </a:r>
+            <a:r>
+              <a:rPr/>
+              <a:t>developed</a:t>
+            </a:r>
+            <a:r>
+              <a:rPr/>
+              <a:t> </a:t>
+            </a:r>
+            <a:r>
+              <a:rPr/>
+              <a:t>by</a:t>
+            </a:r>
+            <a:r>
+              <a:rPr/>
+              <a:t> </a:t>
+            </a:r>
+            <a:r>
+              <a:rPr/>
+              <a:t>synthesizing</a:t>
+            </a:r>
+            <a:r>
+              <a:rPr/>
+              <a:t> </a:t>
+            </a:r>
+            <a:r>
+              <a:rPr/>
+              <a:t>several</a:t>
+            </a:r>
+            <a:r>
+              <a:rPr/>
+              <a:t> </a:t>
+            </a:r>
+            <a:r>
+              <a:rPr/>
+              <a:t>of</a:t>
+            </a:r>
+            <a:r>
+              <a:rPr/>
+              <a:t> </a:t>
+            </a:r>
+            <a:r>
+              <a:rPr/>
+              <a:t>the</a:t>
+            </a:r>
+            <a:r>
+              <a:rPr/>
+              <a:t> </a:t>
+            </a:r>
+            <a:r>
+              <a:rPr/>
+              <a:t>structures</a:t>
+            </a:r>
+            <a:r>
+              <a:rPr/>
+              <a:t> </a:t>
+            </a:r>
+            <a:r>
+              <a:rPr/>
+              <a:t>that</a:t>
+            </a:r>
+            <a:r>
+              <a:rPr/>
+              <a:t> </a:t>
+            </a:r>
+            <a:r>
+              <a:rPr/>
+              <a:t>I</a:t>
+            </a:r>
+            <a:r>
+              <a:rPr/>
+              <a:t> </a:t>
+            </a:r>
+            <a:r>
+              <a:rPr/>
+              <a:t>liked.</a:t>
+            </a:r>
+          </a:p>
+        </p:txBody>
+      </p:sp>
+      <p:sp>
+        <p:nvSpPr>
+          <p:cNvPr id="4" name="Slide Number Placeholder 3"/>
+          <p:cNvSpPr>
+            <a:spLocks noGrp="1"/>
+          </p:cNvSpPr>
+          <p:nvPr>
+            <p:ph type="sldNum" sz="quarter" idx="10"/>
+          </p:nvPr>
+        </p:nvSpPr>
+        <p:spPr/>
+        <p:txBody>
+          <a:bodyPr/>
+          <a:lstStyle/>
+          <a:p>
+            <a:fld id="{18BDFEC3-8487-43E8-A154-7C12CBC1FFF2}" type="slidenum">
+              <a:rPr lang="en-US"/>
+              <a:t>27</a:t>
+            </a:fld>
+            <a:endParaRPr lang="en-US"/>
+          </a:p>
+        </p:txBody>
+      </p:sp>
+    </p:spTree>
+  </p:cSld>
+</p:notes>
+</file>
+
+<file path=ppt/notesSlides/notesSlide27.xml><?xml version="1.0" encoding="utf-8"?>
+<p:notes xmlns:a="http://schemas.openxmlformats.org/drawingml/2006/main" xmlns:r="http://schemas.openxmlformats.org/officeDocument/2006/relationships" xmlns:p="http://schemas.openxmlformats.org/presentationml/2006/main">
+  <p:cSld>
+    <p:spTree>
+      <p:nvGrpSpPr>
+        <p:cNvPr id="1" name=""/>
+        <p:cNvGrpSpPr/>
+        <p:nvPr/>
+      </p:nvGrpSpPr>
+      <p:grpSpPr>
+        <a:xfrm>
+          <a:off x="0" y="0"/>
+          <a:ext cx="0" cy="0"/>
+          <a:chOff x="0" y="0"/>
+          <a:chExt cx="0" cy="0"/>
+        </a:xfrm>
+      </p:grpSpPr>
+      <p:sp>
+        <p:nvSpPr>
+          <p:cNvPr id="2" name="Slide Image Placeholder 1"/>
+          <p:cNvSpPr>
+            <a:spLocks noGrp="1" noRot="1" noChangeAspect="1"/>
+          </p:cNvSpPr>
+          <p:nvPr>
+            <p:ph type="sldImg"/>
+          </p:nvPr>
+        </p:nvSpPr>
+        <p:spPr/>
+      </p:sp>
+      <p:sp>
+        <p:nvSpPr>
+          <p:cNvPr id="3" name="Notes Placeholder 2"/>
+          <p:cNvSpPr>
+            <a:spLocks noGrp="1"/>
+          </p:cNvSpPr>
+          <p:nvPr>
+            <p:ph type="body" idx="1"/>
+          </p:nvPr>
+        </p:nvSpPr>
+        <p:spPr/>
+        <p:txBody>
+          <a:bodyPr/>
+          <a:lstStyle/>
+          <a:p>
+            <a:pPr lvl="0" marL="0" indent="0">
+              <a:buNone/>
+            </a:pPr>
+            <a:r>
+              <a:rPr/>
+              <a:t>Since</a:t>
+            </a:r>
+            <a:r>
+              <a:rPr/>
+              <a:t> </a:t>
+            </a:r>
+            <a:r>
+              <a:rPr/>
+              <a:t>clinical</a:t>
+            </a:r>
+            <a:r>
+              <a:rPr/>
+              <a:t> </a:t>
+            </a:r>
+            <a:r>
+              <a:rPr/>
+              <a:t>research</a:t>
+            </a:r>
+            <a:r>
+              <a:rPr/>
+              <a:t> </a:t>
+            </a:r>
+            <a:r>
+              <a:rPr/>
+              <a:t>almost</a:t>
+            </a:r>
+            <a:r>
+              <a:rPr/>
+              <a:t> </a:t>
+            </a:r>
+            <a:r>
+              <a:rPr/>
+              <a:t>always</a:t>
+            </a:r>
+            <a:r>
+              <a:rPr/>
+              <a:t> </a:t>
+            </a:r>
+            <a:r>
+              <a:rPr/>
+              <a:t>involves</a:t>
+            </a:r>
+            <a:r>
+              <a:rPr/>
+              <a:t> </a:t>
+            </a:r>
+            <a:r>
+              <a:rPr/>
+              <a:t>humans,</a:t>
+            </a:r>
+            <a:r>
+              <a:rPr/>
+              <a:t> </a:t>
+            </a:r>
+            <a:r>
+              <a:rPr/>
+              <a:t>tell</a:t>
+            </a:r>
+            <a:r>
+              <a:rPr/>
+              <a:t> </a:t>
+            </a:r>
+            <a:r>
+              <a:rPr/>
+              <a:t>us</a:t>
+            </a:r>
+            <a:r>
+              <a:rPr/>
+              <a:t> </a:t>
+            </a:r>
+            <a:r>
+              <a:rPr/>
+              <a:t>where</a:t>
+            </a:r>
+            <a:r>
+              <a:rPr/>
+              <a:t> </a:t>
+            </a:r>
+            <a:r>
+              <a:rPr/>
+              <a:t>you</a:t>
+            </a:r>
+            <a:r>
+              <a:rPr/>
+              <a:t> </a:t>
+            </a:r>
+            <a:r>
+              <a:rPr/>
+              <a:t>find</a:t>
+            </a:r>
+            <a:r>
+              <a:rPr/>
+              <a:t> </a:t>
+            </a:r>
+            <a:r>
+              <a:rPr/>
+              <a:t>those</a:t>
+            </a:r>
+            <a:r>
+              <a:rPr/>
+              <a:t> </a:t>
+            </a:r>
+            <a:r>
+              <a:rPr/>
+              <a:t>humans.</a:t>
+            </a:r>
+          </a:p>
+        </p:txBody>
+      </p:sp>
+      <p:sp>
+        <p:nvSpPr>
+          <p:cNvPr id="4" name="Slide Number Placeholder 3"/>
+          <p:cNvSpPr>
+            <a:spLocks noGrp="1"/>
+          </p:cNvSpPr>
+          <p:nvPr>
+            <p:ph type="sldNum" sz="quarter" idx="10"/>
+          </p:nvPr>
+        </p:nvSpPr>
+        <p:spPr/>
+        <p:txBody>
+          <a:bodyPr/>
+          <a:lstStyle/>
+          <a:p>
+            <a:fld id="{18BDFEC3-8487-43E8-A154-7C12CBC1FFF2}" type="slidenum">
+              <a:rPr lang="en-US"/>
+              <a:t>28</a:t>
+            </a:fld>
+            <a:endParaRPr lang="en-US"/>
+          </a:p>
+        </p:txBody>
+      </p:sp>
+    </p:spTree>
+  </p:cSld>
+</p:notes>
+</file>
+
+<file path=ppt/notesSlides/notesSlide28.xml><?xml version="1.0" encoding="utf-8"?>
+<p:notes xmlns:a="http://schemas.openxmlformats.org/drawingml/2006/main" xmlns:r="http://schemas.openxmlformats.org/officeDocument/2006/relationships" xmlns:p="http://schemas.openxmlformats.org/presentationml/2006/main">
+  <p:cSld>
+    <p:spTree>
+      <p:nvGrpSpPr>
+        <p:cNvPr id="1" name=""/>
+        <p:cNvGrpSpPr/>
+        <p:nvPr/>
+      </p:nvGrpSpPr>
+      <p:grpSpPr>
+        <a:xfrm>
+          <a:off x="0" y="0"/>
+          <a:ext cx="0" cy="0"/>
+          <a:chOff x="0" y="0"/>
+          <a:chExt cx="0" cy="0"/>
+        </a:xfrm>
+      </p:grpSpPr>
+      <p:sp>
+        <p:nvSpPr>
+          <p:cNvPr id="2" name="Slide Image Placeholder 1"/>
+          <p:cNvSpPr>
+            <a:spLocks noGrp="1" noRot="1" noChangeAspect="1"/>
+          </p:cNvSpPr>
+          <p:nvPr>
+            <p:ph type="sldImg"/>
+          </p:nvPr>
+        </p:nvSpPr>
+        <p:spPr/>
+      </p:sp>
+      <p:sp>
+        <p:nvSpPr>
+          <p:cNvPr id="3" name="Notes Placeholder 2"/>
+          <p:cNvSpPr>
+            <a:spLocks noGrp="1"/>
+          </p:cNvSpPr>
+          <p:nvPr>
+            <p:ph type="body" idx="1"/>
+          </p:nvPr>
+        </p:nvSpPr>
+        <p:spPr/>
+        <p:txBody>
+          <a:bodyPr/>
+          <a:lstStyle/>
+          <a:p>
+            <a:pPr lvl="0" marL="0" indent="0">
+              <a:buNone/>
+            </a:pPr>
+            <a:r>
+              <a:rPr/>
+              <a:t>For</a:t>
+            </a:r>
+            <a:r>
+              <a:rPr/>
+              <a:t> </a:t>
+            </a:r>
+            <a:r>
+              <a:rPr/>
+              <a:t>materials</a:t>
+            </a:r>
+            <a:r>
+              <a:rPr/>
+              <a:t> </a:t>
+            </a:r>
+            <a:r>
+              <a:rPr/>
+              <a:t>and</a:t>
+            </a:r>
+            <a:r>
+              <a:rPr/>
+              <a:t> </a:t>
+            </a:r>
+            <a:r>
+              <a:rPr/>
+              <a:t>procedures,</a:t>
+            </a:r>
+            <a:r>
+              <a:rPr/>
+              <a:t> </a:t>
+            </a:r>
+            <a:r>
+              <a:rPr/>
+              <a:t>only</a:t>
+            </a:r>
+            <a:r>
+              <a:rPr/>
+              <a:t> </a:t>
+            </a:r>
+            <a:r>
+              <a:rPr/>
+              <a:t>document</a:t>
+            </a:r>
+            <a:r>
+              <a:rPr/>
+              <a:t> </a:t>
+            </a:r>
+            <a:r>
+              <a:rPr/>
+              <a:t>the</a:t>
+            </a:r>
+            <a:r>
+              <a:rPr/>
+              <a:t> </a:t>
+            </a:r>
+            <a:r>
+              <a:rPr/>
+              <a:t>stuff</a:t>
+            </a:r>
+            <a:r>
+              <a:rPr/>
+              <a:t> </a:t>
+            </a:r>
+            <a:r>
+              <a:rPr/>
+              <a:t>that</a:t>
+            </a:r>
+            <a:r>
+              <a:rPr/>
+              <a:t> </a:t>
+            </a:r>
+            <a:r>
+              <a:rPr/>
+              <a:t>is</a:t>
+            </a:r>
+            <a:r>
+              <a:rPr/>
+              <a:t> </a:t>
+            </a:r>
+            <a:r>
+              <a:rPr/>
+              <a:t>non-obvious.</a:t>
+            </a:r>
+            <a:r>
+              <a:rPr/>
+              <a:t> </a:t>
+            </a:r>
+            <a:r>
+              <a:rPr/>
+              <a:t>Anyone</a:t>
+            </a:r>
+            <a:r>
+              <a:rPr/>
+              <a:t> </a:t>
+            </a:r>
+            <a:r>
+              <a:rPr/>
+              <a:t>with</a:t>
+            </a:r>
+            <a:r>
+              <a:rPr/>
+              <a:t> </a:t>
+            </a:r>
+            <a:r>
+              <a:rPr/>
+              <a:t>a</a:t>
+            </a:r>
+            <a:r>
+              <a:rPr/>
+              <a:t> </a:t>
+            </a:r>
+            <a:r>
+              <a:rPr/>
+              <a:t>reasonable</a:t>
+            </a:r>
+            <a:r>
+              <a:rPr/>
+              <a:t> </a:t>
+            </a:r>
+            <a:r>
+              <a:rPr/>
+              <a:t>medical</a:t>
+            </a:r>
+            <a:r>
+              <a:rPr/>
+              <a:t> </a:t>
+            </a:r>
+            <a:r>
+              <a:rPr/>
+              <a:t>background</a:t>
+            </a:r>
+            <a:r>
+              <a:rPr/>
+              <a:t> </a:t>
+            </a:r>
+            <a:r>
+              <a:rPr/>
+              <a:t>knows</a:t>
+            </a:r>
+            <a:r>
+              <a:rPr/>
+              <a:t> </a:t>
+            </a:r>
+            <a:r>
+              <a:rPr/>
+              <a:t>how</a:t>
+            </a:r>
+            <a:r>
+              <a:rPr/>
+              <a:t> </a:t>
+            </a:r>
+            <a:r>
+              <a:rPr/>
+              <a:t>to</a:t>
+            </a:r>
+            <a:r>
+              <a:rPr/>
+              <a:t> </a:t>
+            </a:r>
+            <a:r>
+              <a:rPr/>
+              <a:t>take</a:t>
+            </a:r>
+            <a:r>
+              <a:rPr/>
+              <a:t> </a:t>
+            </a:r>
+            <a:r>
+              <a:rPr/>
+              <a:t>a</a:t>
+            </a:r>
+            <a:r>
+              <a:rPr/>
+              <a:t> </a:t>
+            </a:r>
+            <a:r>
+              <a:rPr/>
+              <a:t>blood</a:t>
+            </a:r>
+            <a:r>
+              <a:rPr/>
+              <a:t> </a:t>
+            </a:r>
+            <a:r>
+              <a:rPr/>
+              <a:t>pressure,</a:t>
+            </a:r>
+            <a:r>
+              <a:rPr/>
+              <a:t> </a:t>
+            </a:r>
+            <a:r>
+              <a:rPr/>
+              <a:t>so</a:t>
+            </a:r>
+            <a:r>
+              <a:rPr/>
+              <a:t> </a:t>
+            </a:r>
+            <a:r>
+              <a:rPr/>
+              <a:t>don’t</a:t>
+            </a:r>
+            <a:r>
+              <a:rPr/>
+              <a:t> </a:t>
+            </a:r>
+            <a:r>
+              <a:rPr/>
+              <a:t>mention</a:t>
+            </a:r>
+            <a:r>
+              <a:rPr/>
+              <a:t> </a:t>
+            </a:r>
+            <a:r>
+              <a:rPr/>
+              <a:t>any</a:t>
+            </a:r>
+            <a:r>
+              <a:rPr/>
+              <a:t> </a:t>
+            </a:r>
+            <a:r>
+              <a:rPr/>
+              <a:t>details,</a:t>
+            </a:r>
+            <a:r>
+              <a:rPr/>
+              <a:t> </a:t>
+            </a:r>
+            <a:r>
+              <a:rPr/>
+              <a:t>unless</a:t>
+            </a:r>
+            <a:r>
+              <a:rPr/>
+              <a:t> </a:t>
+            </a:r>
+            <a:r>
+              <a:rPr/>
+              <a:t>you</a:t>
+            </a:r>
+            <a:r>
+              <a:rPr/>
+              <a:t> </a:t>
+            </a:r>
+            <a:r>
+              <a:rPr/>
+              <a:t>are</a:t>
+            </a:r>
+            <a:r>
+              <a:rPr/>
+              <a:t> </a:t>
+            </a:r>
+            <a:r>
+              <a:rPr/>
+              <a:t>deviating</a:t>
+            </a:r>
+            <a:r>
+              <a:rPr/>
+              <a:t> </a:t>
+            </a:r>
+            <a:r>
+              <a:rPr/>
+              <a:t>from</a:t>
+            </a:r>
+            <a:r>
+              <a:rPr/>
+              <a:t> </a:t>
+            </a:r>
+            <a:r>
+              <a:rPr/>
+              <a:t>a</a:t>
+            </a:r>
+            <a:r>
+              <a:rPr/>
+              <a:t> </a:t>
+            </a:r>
+            <a:r>
+              <a:rPr/>
+              <a:t>common</a:t>
+            </a:r>
+            <a:r>
+              <a:rPr/>
+              <a:t> </a:t>
+            </a:r>
+            <a:r>
+              <a:rPr/>
+              <a:t>norm</a:t>
+            </a:r>
+            <a:r>
+              <a:rPr/>
+              <a:t> </a:t>
+            </a:r>
+            <a:r>
+              <a:rPr/>
+              <a:t>(e.g.,</a:t>
+            </a:r>
+            <a:r>
+              <a:rPr/>
+              <a:t> </a:t>
+            </a:r>
+            <a:r>
+              <a:rPr/>
+              <a:t>taking</a:t>
+            </a:r>
+            <a:r>
+              <a:rPr/>
+              <a:t> </a:t>
+            </a:r>
+            <a:r>
+              <a:rPr/>
+              <a:t>blood</a:t>
+            </a:r>
+            <a:r>
+              <a:rPr/>
+              <a:t> </a:t>
+            </a:r>
+            <a:r>
+              <a:rPr/>
+              <a:t>pressure</a:t>
+            </a:r>
+            <a:r>
+              <a:rPr/>
+              <a:t> </a:t>
+            </a:r>
+            <a:r>
+              <a:rPr/>
+              <a:t>from</a:t>
+            </a:r>
+            <a:r>
+              <a:rPr/>
+              <a:t> </a:t>
+            </a:r>
+            <a:r>
+              <a:rPr/>
+              <a:t>a</a:t>
+            </a:r>
+            <a:r>
+              <a:rPr/>
+              <a:t> </a:t>
+            </a:r>
+            <a:r>
+              <a:rPr/>
+              <a:t>leg).</a:t>
+            </a:r>
+          </a:p>
+        </p:txBody>
+      </p:sp>
+      <p:sp>
+        <p:nvSpPr>
+          <p:cNvPr id="4" name="Slide Number Placeholder 3"/>
+          <p:cNvSpPr>
+            <a:spLocks noGrp="1"/>
+          </p:cNvSpPr>
+          <p:nvPr>
+            <p:ph type="sldNum" sz="quarter" idx="10"/>
+          </p:nvPr>
+        </p:nvSpPr>
+        <p:spPr/>
+        <p:txBody>
+          <a:bodyPr/>
+          <a:lstStyle/>
+          <a:p>
+            <a:fld id="{18BDFEC3-8487-43E8-A154-7C12CBC1FFF2}" type="slidenum">
+              <a:rPr lang="en-US"/>
+              <a:t>29</a:t>
+            </a:fld>
+            <a:endParaRPr lang="en-US"/>
+          </a:p>
+        </p:txBody>
+      </p:sp>
+    </p:spTree>
+  </p:cSld>
+</p:notes>
+</file>
+
+<file path=ppt/notesSlides/notesSlide29.xml><?xml version="1.0" encoding="utf-8"?>
+<p:notes xmlns:a="http://schemas.openxmlformats.org/drawingml/2006/main" xmlns:r="http://schemas.openxmlformats.org/officeDocument/2006/relationships" xmlns:p="http://schemas.openxmlformats.org/presentationml/2006/main">
+  <p:cSld>
+    <p:spTree>
+      <p:nvGrpSpPr>
+        <p:cNvPr id="1" name=""/>
+        <p:cNvGrpSpPr/>
+        <p:nvPr/>
+      </p:nvGrpSpPr>
+      <p:grpSpPr>
+        <a:xfrm>
+          <a:off x="0" y="0"/>
+          <a:ext cx="0" cy="0"/>
+          <a:chOff x="0" y="0"/>
+          <a:chExt cx="0" cy="0"/>
+        </a:xfrm>
+      </p:grpSpPr>
+      <p:sp>
+        <p:nvSpPr>
+          <p:cNvPr id="2" name="Slide Image Placeholder 1"/>
+          <p:cNvSpPr>
+            <a:spLocks noGrp="1" noRot="1" noChangeAspect="1"/>
+          </p:cNvSpPr>
+          <p:nvPr>
+            <p:ph type="sldImg"/>
+          </p:nvPr>
+        </p:nvSpPr>
+        <p:spPr/>
+      </p:sp>
+      <p:sp>
+        <p:nvSpPr>
+          <p:cNvPr id="3" name="Notes Placeholder 2"/>
+          <p:cNvSpPr>
+            <a:spLocks noGrp="1"/>
+          </p:cNvSpPr>
+          <p:nvPr>
+            <p:ph type="body" idx="1"/>
+          </p:nvPr>
+        </p:nvSpPr>
+        <p:spPr/>
+        <p:txBody>
+          <a:bodyPr/>
+          <a:lstStyle/>
+          <a:p>
+            <a:pPr lvl="0" marL="0" indent="0">
+              <a:buNone/>
+            </a:pPr>
+            <a:r>
+              <a:rPr/>
+              <a:t>Define</a:t>
+            </a:r>
+            <a:r>
+              <a:rPr/>
+              <a:t> </a:t>
+            </a:r>
+            <a:r>
+              <a:rPr/>
+              <a:t>your</a:t>
+            </a:r>
+            <a:r>
+              <a:rPr/>
+              <a:t> </a:t>
+            </a:r>
+            <a:r>
+              <a:rPr/>
+              <a:t>variables</a:t>
+            </a:r>
+            <a:r>
+              <a:rPr/>
+              <a:t> </a:t>
+            </a:r>
+            <a:r>
+              <a:rPr/>
+              <a:t>and</a:t>
+            </a:r>
+            <a:r>
+              <a:rPr/>
+              <a:t> </a:t>
+            </a:r>
+            <a:r>
+              <a:rPr/>
+              <a:t>classify</a:t>
+            </a:r>
+            <a:r>
+              <a:rPr/>
+              <a:t> </a:t>
+            </a:r>
+            <a:r>
+              <a:rPr/>
+              <a:t>them</a:t>
+            </a:r>
+            <a:r>
+              <a:rPr/>
+              <a:t> </a:t>
+            </a:r>
+            <a:r>
+              <a:rPr/>
+              <a:t>into</a:t>
+            </a:r>
+            <a:r>
+              <a:rPr/>
+              <a:t> </a:t>
+            </a:r>
+            <a:r>
+              <a:rPr/>
+              <a:t>outcomes,</a:t>
+            </a:r>
+            <a:r>
+              <a:rPr/>
+              <a:t> </a:t>
+            </a:r>
+            <a:r>
+              <a:rPr/>
+              <a:t>independent</a:t>
+            </a:r>
+            <a:r>
+              <a:rPr/>
+              <a:t> </a:t>
+            </a:r>
+            <a:r>
+              <a:rPr/>
+              <a:t>variables,</a:t>
+            </a:r>
+            <a:r>
+              <a:rPr/>
+              <a:t> </a:t>
+            </a:r>
+            <a:r>
+              <a:rPr/>
+              <a:t>and</a:t>
+            </a:r>
+            <a:r>
+              <a:rPr/>
+              <a:t> </a:t>
+            </a:r>
+            <a:r>
+              <a:rPr/>
+              <a:t>covariates.</a:t>
+            </a:r>
+            <a:r>
+              <a:rPr/>
+              <a:t> </a:t>
+            </a:r>
+            <a:r>
+              <a:rPr/>
+              <a:t>For</a:t>
+            </a:r>
+            <a:r>
+              <a:rPr/>
+              <a:t> </a:t>
+            </a:r>
+            <a:r>
+              <a:rPr/>
+              <a:t>those</a:t>
+            </a:r>
+            <a:r>
+              <a:rPr/>
+              <a:t> </a:t>
+            </a:r>
+            <a:r>
+              <a:rPr/>
+              <a:t>variables</a:t>
+            </a:r>
+            <a:r>
+              <a:rPr/>
+              <a:t> </a:t>
+            </a:r>
+            <a:r>
+              <a:rPr/>
+              <a:t>where</a:t>
+            </a:r>
+            <a:r>
+              <a:rPr/>
+              <a:t> </a:t>
+            </a:r>
+            <a:r>
+              <a:rPr/>
+              <a:t>it</a:t>
+            </a:r>
+            <a:r>
+              <a:rPr/>
+              <a:t> </a:t>
+            </a:r>
+            <a:r>
+              <a:rPr/>
+              <a:t>is</a:t>
+            </a:r>
+            <a:r>
+              <a:rPr/>
+              <a:t> </a:t>
+            </a:r>
+            <a:r>
+              <a:rPr/>
+              <a:t>appropriate,</a:t>
+            </a:r>
+            <a:r>
+              <a:rPr/>
+              <a:t> </a:t>
+            </a:r>
+            <a:r>
+              <a:rPr/>
+              <a:t>discuss</a:t>
+            </a:r>
+            <a:r>
+              <a:rPr/>
+              <a:t> </a:t>
+            </a:r>
+            <a:r>
+              <a:rPr/>
+              <a:t>what</a:t>
+            </a:r>
+            <a:r>
+              <a:rPr/>
+              <a:t> </a:t>
+            </a:r>
+            <a:r>
+              <a:rPr/>
+              <a:t>you</a:t>
+            </a:r>
+            <a:r>
+              <a:rPr/>
+              <a:t> </a:t>
+            </a:r>
+            <a:r>
+              <a:rPr/>
+              <a:t>already</a:t>
+            </a:r>
+            <a:r>
+              <a:rPr/>
+              <a:t> </a:t>
+            </a:r>
+            <a:r>
+              <a:rPr/>
+              <a:t>know</a:t>
+            </a:r>
+            <a:r>
+              <a:rPr/>
+              <a:t> </a:t>
+            </a:r>
+            <a:r>
+              <a:rPr/>
+              <a:t>about</a:t>
+            </a:r>
+            <a:r>
+              <a:rPr/>
+              <a:t> </a:t>
+            </a:r>
+            <a:r>
+              <a:rPr/>
+              <a:t>validity</a:t>
+            </a:r>
+            <a:r>
+              <a:rPr/>
+              <a:t> </a:t>
+            </a:r>
+            <a:r>
+              <a:rPr/>
+              <a:t>and</a:t>
+            </a:r>
+            <a:r>
+              <a:rPr/>
+              <a:t> </a:t>
+            </a:r>
+            <a:r>
+              <a:rPr/>
+              <a:t>reliability.</a:t>
+            </a:r>
+          </a:p>
+        </p:txBody>
+      </p:sp>
+      <p:sp>
+        <p:nvSpPr>
+          <p:cNvPr id="4" name="Slide Number Placeholder 3"/>
+          <p:cNvSpPr>
+            <a:spLocks noGrp="1"/>
+          </p:cNvSpPr>
+          <p:nvPr>
+            <p:ph type="sldNum" sz="quarter" idx="10"/>
+          </p:nvPr>
+        </p:nvSpPr>
+        <p:spPr/>
+        <p:txBody>
+          <a:bodyPr/>
+          <a:lstStyle/>
+          <a:p>
+            <a:fld id="{18BDFEC3-8487-43E8-A154-7C12CBC1FFF2}" type="slidenum">
+              <a:rPr lang="en-US"/>
+              <a:t>30</a:t>
+            </a:fld>
+            <a:endParaRPr lang="en-US"/>
+          </a:p>
+        </p:txBody>
+      </p:sp>
+    </p:spTree>
+  </p:cSld>
+</p:notes>
+</file>
+
 <file path=ppt/notesSlides/notesSlide3.xml><?xml version="1.0" encoding="utf-8"?>
 <p:notes xmlns:a="http://schemas.openxmlformats.org/drawingml/2006/main" xmlns:r="http://schemas.openxmlformats.org/officeDocument/2006/relationships" xmlns:p="http://schemas.openxmlformats.org/presentationml/2006/main">
   <p:cSld>
@@ -22183,6 +24570,1210 @@
             <a:fld id="{18BDFEC3-8487-43E8-A154-7C12CBC1FFF2}" type="slidenum">
               <a:rPr lang="en-US"/>
               <a:t>4</a:t>
+            </a:fld>
+            <a:endParaRPr lang="en-US"/>
+          </a:p>
+        </p:txBody>
+      </p:sp>
+    </p:spTree>
+  </p:cSld>
+</p:notes>
+</file>
+
+<file path=ppt/notesSlides/notesSlide30.xml><?xml version="1.0" encoding="utf-8"?>
+<p:notes xmlns:a="http://schemas.openxmlformats.org/drawingml/2006/main" xmlns:r="http://schemas.openxmlformats.org/officeDocument/2006/relationships" xmlns:p="http://schemas.openxmlformats.org/presentationml/2006/main">
+  <p:cSld>
+    <p:spTree>
+      <p:nvGrpSpPr>
+        <p:cNvPr id="1" name=""/>
+        <p:cNvGrpSpPr/>
+        <p:nvPr/>
+      </p:nvGrpSpPr>
+      <p:grpSpPr>
+        <a:xfrm>
+          <a:off x="0" y="0"/>
+          <a:ext cx="0" cy="0"/>
+          <a:chOff x="0" y="0"/>
+          <a:chExt cx="0" cy="0"/>
+        </a:xfrm>
+      </p:grpSpPr>
+      <p:sp>
+        <p:nvSpPr>
+          <p:cNvPr id="2" name="Slide Image Placeholder 1"/>
+          <p:cNvSpPr>
+            <a:spLocks noGrp="1" noRot="1" noChangeAspect="1"/>
+          </p:cNvSpPr>
+          <p:nvPr>
+            <p:ph type="sldImg"/>
+          </p:nvPr>
+        </p:nvSpPr>
+        <p:spPr/>
+      </p:sp>
+      <p:sp>
+        <p:nvSpPr>
+          <p:cNvPr id="3" name="Notes Placeholder 2"/>
+          <p:cNvSpPr>
+            <a:spLocks noGrp="1"/>
+          </p:cNvSpPr>
+          <p:nvPr>
+            <p:ph type="body" idx="1"/>
+          </p:nvPr>
+        </p:nvSpPr>
+        <p:spPr/>
+        <p:txBody>
+          <a:bodyPr/>
+          <a:lstStyle/>
+          <a:p>
+            <a:pPr lvl="0" marL="0" indent="0">
+              <a:buNone/>
+            </a:pPr>
+            <a:r>
+              <a:rPr/>
+              <a:t>Boilerplate</a:t>
+            </a:r>
+            <a:r>
+              <a:rPr/>
+              <a:t> </a:t>
+            </a:r>
+            <a:r>
+              <a:rPr/>
+              <a:t>refers</a:t>
+            </a:r>
+            <a:r>
+              <a:rPr/>
+              <a:t> </a:t>
+            </a:r>
+            <a:r>
+              <a:rPr/>
+              <a:t>to</a:t>
+            </a:r>
+            <a:r>
+              <a:rPr/>
+              <a:t> </a:t>
+            </a:r>
+            <a:r>
+              <a:rPr/>
+              <a:t>text</a:t>
+            </a:r>
+            <a:r>
+              <a:rPr/>
+              <a:t> </a:t>
+            </a:r>
+            <a:r>
+              <a:rPr/>
+              <a:t>that</a:t>
+            </a:r>
+            <a:r>
+              <a:rPr/>
+              <a:t> </a:t>
+            </a:r>
+            <a:r>
+              <a:rPr/>
+              <a:t>is</a:t>
+            </a:r>
+            <a:r>
+              <a:rPr/>
+              <a:t> </a:t>
+            </a:r>
+            <a:r>
+              <a:rPr/>
+              <a:t>used</a:t>
+            </a:r>
+            <a:r>
+              <a:rPr/>
+              <a:t> </a:t>
+            </a:r>
+            <a:r>
+              <a:rPr/>
+              <a:t>so</a:t>
+            </a:r>
+            <a:r>
+              <a:rPr/>
+              <a:t> </a:t>
+            </a:r>
+            <a:r>
+              <a:rPr/>
+              <a:t>often</a:t>
+            </a:r>
+            <a:r>
+              <a:rPr/>
+              <a:t> </a:t>
+            </a:r>
+            <a:r>
+              <a:rPr/>
+              <a:t>and</a:t>
+            </a:r>
+            <a:r>
+              <a:rPr/>
+              <a:t> </a:t>
+            </a:r>
+            <a:r>
+              <a:rPr/>
+              <a:t>without</a:t>
+            </a:r>
+            <a:r>
+              <a:rPr/>
+              <a:t> </a:t>
+            </a:r>
+            <a:r>
+              <a:rPr/>
+              <a:t>any</a:t>
+            </a:r>
+            <a:r>
+              <a:rPr/>
+              <a:t> </a:t>
+            </a:r>
+            <a:r>
+              <a:rPr/>
+              <a:t>changes</a:t>
+            </a:r>
+            <a:r>
+              <a:rPr/>
+              <a:t> </a:t>
+            </a:r>
+            <a:r>
+              <a:rPr/>
+              <a:t>that</a:t>
+            </a:r>
+            <a:r>
+              <a:rPr/>
+              <a:t> </a:t>
+            </a:r>
+            <a:r>
+              <a:rPr/>
+              <a:t>you</a:t>
+            </a:r>
+            <a:r>
+              <a:rPr/>
+              <a:t> </a:t>
+            </a:r>
+            <a:r>
+              <a:rPr/>
+              <a:t>can</a:t>
+            </a:r>
+            <a:r>
+              <a:rPr/>
+              <a:t> </a:t>
+            </a:r>
+            <a:r>
+              <a:rPr/>
+              <a:t>safely</a:t>
+            </a:r>
+            <a:r>
+              <a:rPr/>
+              <a:t> </a:t>
+            </a:r>
+            <a:r>
+              <a:rPr/>
+              <a:t>use</a:t>
+            </a:r>
+            <a:r>
+              <a:rPr/>
+              <a:t> </a:t>
+            </a:r>
+            <a:r>
+              <a:rPr/>
+              <a:t>it</a:t>
+            </a:r>
+            <a:r>
+              <a:rPr/>
+              <a:t> </a:t>
+            </a:r>
+            <a:r>
+              <a:rPr/>
+              <a:t>in</a:t>
+            </a:r>
+            <a:r>
+              <a:rPr/>
+              <a:t> </a:t>
+            </a:r>
+            <a:r>
+              <a:rPr/>
+              <a:t>your</a:t>
+            </a:r>
+            <a:r>
+              <a:rPr/>
+              <a:t> </a:t>
+            </a:r>
+            <a:r>
+              <a:rPr/>
+              <a:t>publication</a:t>
+            </a:r>
+            <a:r>
+              <a:rPr/>
+              <a:t> </a:t>
+            </a:r>
+            <a:r>
+              <a:rPr/>
+              <a:t>without</a:t>
+            </a:r>
+            <a:r>
+              <a:rPr/>
+              <a:t> </a:t>
+            </a:r>
+            <a:r>
+              <a:rPr/>
+              <a:t>fear</a:t>
+            </a:r>
+            <a:r>
+              <a:rPr/>
+              <a:t> </a:t>
+            </a:r>
+            <a:r>
+              <a:rPr/>
+              <a:t>of</a:t>
+            </a:r>
+            <a:r>
+              <a:rPr/>
+              <a:t> </a:t>
+            </a:r>
+            <a:r>
+              <a:rPr/>
+              <a:t>being</a:t>
+            </a:r>
+            <a:r>
+              <a:rPr/>
+              <a:t> </a:t>
+            </a:r>
+            <a:r>
+              <a:rPr/>
+              <a:t>accused</a:t>
+            </a:r>
+            <a:r>
+              <a:rPr/>
+              <a:t> </a:t>
+            </a:r>
+            <a:r>
+              <a:rPr/>
+              <a:t>of</a:t>
+            </a:r>
+            <a:r>
+              <a:rPr/>
+              <a:t> </a:t>
+            </a:r>
+            <a:r>
+              <a:rPr/>
+              <a:t>plagiarism.</a:t>
+            </a:r>
+            <a:r>
+              <a:rPr/>
+              <a:t> </a:t>
+            </a:r>
+            <a:r>
+              <a:rPr/>
+              <a:t>The</a:t>
+            </a:r>
+            <a:r>
+              <a:rPr/>
+              <a:t> </a:t>
+            </a:r>
+            <a:r>
+              <a:rPr/>
+              <a:t>first</a:t>
+            </a:r>
+            <a:r>
+              <a:rPr/>
+              <a:t> </a:t>
+            </a:r>
+            <a:r>
+              <a:rPr/>
+              <a:t>boilerplate</a:t>
+            </a:r>
+            <a:r>
+              <a:rPr/>
+              <a:t> </a:t>
+            </a:r>
+            <a:r>
+              <a:rPr/>
+              <a:t>comes</a:t>
+            </a:r>
+            <a:r>
+              <a:rPr/>
+              <a:t> </a:t>
+            </a:r>
+            <a:r>
+              <a:rPr/>
+              <a:t>early</a:t>
+            </a:r>
+            <a:r>
+              <a:rPr/>
+              <a:t> </a:t>
+            </a:r>
+            <a:r>
+              <a:rPr/>
+              <a:t>in</a:t>
+            </a:r>
+            <a:r>
+              <a:rPr/>
+              <a:t> </a:t>
+            </a:r>
+            <a:r>
+              <a:rPr/>
+              <a:t>your</a:t>
+            </a:r>
+            <a:r>
+              <a:rPr/>
+              <a:t> </a:t>
+            </a:r>
+            <a:r>
+              <a:rPr/>
+              <a:t>data</a:t>
+            </a:r>
+            <a:r>
+              <a:rPr/>
+              <a:t> </a:t>
+            </a:r>
+            <a:r>
+              <a:rPr/>
+              <a:t>analysis</a:t>
+            </a:r>
+            <a:r>
+              <a:rPr/>
+              <a:t> </a:t>
+            </a:r>
+            <a:r>
+              <a:rPr/>
+              <a:t>methods,</a:t>
+            </a:r>
+            <a:r>
+              <a:rPr/>
+              <a:t> </a:t>
+            </a:r>
+            <a:r>
+              <a:rPr/>
+              <a:t>and</a:t>
+            </a:r>
+            <a:r>
+              <a:rPr/>
+              <a:t> </a:t>
+            </a:r>
+            <a:r>
+              <a:rPr/>
+              <a:t>describes</a:t>
+            </a:r>
+            <a:r>
+              <a:rPr/>
+              <a:t> </a:t>
+            </a:r>
+            <a:r>
+              <a:rPr/>
+              <a:t>how</a:t>
+            </a:r>
+            <a:r>
+              <a:rPr/>
+              <a:t> </a:t>
+            </a:r>
+            <a:r>
+              <a:rPr/>
+              <a:t>you</a:t>
+            </a:r>
+            <a:r>
+              <a:rPr/>
+              <a:t> </a:t>
+            </a:r>
+            <a:r>
+              <a:rPr/>
+              <a:t>are</a:t>
+            </a:r>
+            <a:r>
+              <a:rPr/>
+              <a:t> </a:t>
+            </a:r>
+            <a:r>
+              <a:rPr/>
+              <a:t>summarizing</a:t>
+            </a:r>
+            <a:r>
+              <a:rPr/>
+              <a:t> </a:t>
+            </a:r>
+            <a:r>
+              <a:rPr/>
+              <a:t>continuous</a:t>
+            </a:r>
+            <a:r>
+              <a:rPr/>
+              <a:t> </a:t>
+            </a:r>
+            <a:r>
+              <a:rPr/>
+              <a:t>variables</a:t>
+            </a:r>
+            <a:r>
+              <a:rPr/>
+              <a:t> </a:t>
+            </a:r>
+            <a:r>
+              <a:rPr/>
+              <a:t>using</a:t>
+            </a:r>
+            <a:r>
+              <a:rPr/>
+              <a:t> </a:t>
+            </a:r>
+            <a:r>
+              <a:rPr/>
+              <a:t>means</a:t>
+            </a:r>
+            <a:r>
+              <a:rPr/>
+              <a:t> </a:t>
+            </a:r>
+            <a:r>
+              <a:rPr/>
+              <a:t>and</a:t>
+            </a:r>
+            <a:r>
+              <a:rPr/>
+              <a:t> </a:t>
+            </a:r>
+            <a:r>
+              <a:rPr/>
+              <a:t>standard</a:t>
+            </a:r>
+            <a:r>
+              <a:rPr/>
+              <a:t> </a:t>
+            </a:r>
+            <a:r>
+              <a:rPr/>
+              <a:t>deviations</a:t>
+            </a:r>
+            <a:r>
+              <a:rPr/>
+              <a:t> </a:t>
+            </a:r>
+            <a:r>
+              <a:rPr/>
+              <a:t>and</a:t>
+            </a:r>
+            <a:r>
+              <a:rPr/>
+              <a:t> </a:t>
+            </a:r>
+            <a:r>
+              <a:rPr/>
+              <a:t>summarizing</a:t>
+            </a:r>
+            <a:r>
+              <a:rPr/>
+              <a:t> </a:t>
+            </a:r>
+            <a:r>
+              <a:rPr/>
+              <a:t>categorical</a:t>
+            </a:r>
+            <a:r>
+              <a:rPr/>
+              <a:t> </a:t>
+            </a:r>
+            <a:r>
+              <a:rPr/>
+              <a:t>variables</a:t>
+            </a:r>
+            <a:r>
+              <a:rPr/>
+              <a:t> </a:t>
+            </a:r>
+            <a:r>
+              <a:rPr/>
+              <a:t>using</a:t>
+            </a:r>
+            <a:r>
+              <a:rPr/>
+              <a:t> </a:t>
+            </a:r>
+            <a:r>
+              <a:rPr/>
+              <a:t>percentages.</a:t>
+            </a:r>
+            <a:r>
+              <a:rPr/>
+              <a:t> </a:t>
+            </a:r>
+            <a:r>
+              <a:rPr/>
+              <a:t>The</a:t>
+            </a:r>
+            <a:r>
+              <a:rPr/>
+              <a:t> </a:t>
+            </a:r>
+            <a:r>
+              <a:rPr/>
+              <a:t>second</a:t>
+            </a:r>
+            <a:r>
+              <a:rPr/>
+              <a:t> </a:t>
+            </a:r>
+            <a:r>
+              <a:rPr/>
+              <a:t>boilerplate</a:t>
+            </a:r>
+            <a:r>
+              <a:rPr/>
+              <a:t> </a:t>
+            </a:r>
+            <a:r>
+              <a:rPr/>
+              <a:t>mentions</a:t>
+            </a:r>
+            <a:r>
+              <a:rPr/>
+              <a:t> </a:t>
+            </a:r>
+            <a:r>
+              <a:rPr/>
+              <a:t>that</a:t>
+            </a:r>
+            <a:r>
+              <a:rPr/>
+              <a:t> </a:t>
+            </a:r>
+            <a:r>
+              <a:rPr/>
+              <a:t>all</a:t>
+            </a:r>
+            <a:r>
+              <a:rPr/>
+              <a:t> </a:t>
+            </a:r>
+            <a:r>
+              <a:rPr/>
+              <a:t>of</a:t>
+            </a:r>
+            <a:r>
+              <a:rPr/>
+              <a:t> </a:t>
+            </a:r>
+            <a:r>
+              <a:rPr/>
+              <a:t>your</a:t>
+            </a:r>
+            <a:r>
+              <a:rPr/>
+              <a:t> </a:t>
+            </a:r>
+            <a:r>
+              <a:rPr/>
+              <a:t>statistical</a:t>
+            </a:r>
+            <a:r>
+              <a:rPr/>
+              <a:t> </a:t>
+            </a:r>
+            <a:r>
+              <a:rPr/>
+              <a:t>tests</a:t>
+            </a:r>
+            <a:r>
+              <a:rPr/>
+              <a:t> </a:t>
+            </a:r>
+            <a:r>
+              <a:rPr/>
+              <a:t>are</a:t>
+            </a:r>
+            <a:r>
+              <a:rPr/>
+              <a:t> </a:t>
+            </a:r>
+            <a:r>
+              <a:rPr/>
+              <a:t>two</a:t>
+            </a:r>
+            <a:r>
+              <a:rPr/>
+              <a:t> </a:t>
+            </a:r>
+            <a:r>
+              <a:rPr/>
+              <a:t>sided</a:t>
+            </a:r>
+            <a:r>
+              <a:rPr/>
+              <a:t> </a:t>
+            </a:r>
+            <a:r>
+              <a:rPr/>
+              <a:t>(which</a:t>
+            </a:r>
+            <a:r>
+              <a:rPr/>
+              <a:t> </a:t>
+            </a:r>
+            <a:r>
+              <a:rPr/>
+              <a:t>they</a:t>
+            </a:r>
+            <a:r>
+              <a:rPr/>
+              <a:t> </a:t>
+            </a:r>
+            <a:r>
+              <a:rPr/>
+              <a:t>are</a:t>
+            </a:r>
+            <a:r>
+              <a:rPr/>
+              <a:t> </a:t>
+            </a:r>
+            <a:r>
+              <a:rPr/>
+              <a:t>90%</a:t>
+            </a:r>
+            <a:r>
+              <a:rPr/>
+              <a:t> </a:t>
+            </a:r>
+            <a:r>
+              <a:rPr/>
+              <a:t>of</a:t>
+            </a:r>
+            <a:r>
+              <a:rPr/>
+              <a:t> </a:t>
+            </a:r>
+            <a:r>
+              <a:rPr/>
+              <a:t>the</a:t>
+            </a:r>
+            <a:r>
+              <a:rPr/>
+              <a:t> </a:t>
+            </a:r>
+            <a:r>
+              <a:rPr/>
+              <a:t>time)</a:t>
+            </a:r>
+            <a:r>
+              <a:rPr/>
+              <a:t> </a:t>
+            </a:r>
+            <a:r>
+              <a:rPr/>
+              <a:t>and</a:t>
+            </a:r>
+            <a:r>
+              <a:rPr/>
+              <a:t> </a:t>
+            </a:r>
+            <a:r>
+              <a:rPr/>
+              <a:t>that</a:t>
+            </a:r>
+            <a:r>
+              <a:rPr/>
+              <a:t> </a:t>
+            </a:r>
+            <a:r>
+              <a:rPr/>
+              <a:t>you</a:t>
+            </a:r>
+            <a:r>
+              <a:rPr/>
+              <a:t> </a:t>
+            </a:r>
+            <a:r>
+              <a:rPr/>
+              <a:t>use</a:t>
+            </a:r>
+            <a:r>
+              <a:rPr/>
+              <a:t> </a:t>
+            </a:r>
+            <a:r>
+              <a:rPr/>
+              <a:t>an</a:t>
+            </a:r>
+            <a:r>
+              <a:rPr/>
+              <a:t> </a:t>
+            </a:r>
+            <a:r>
+              <a:rPr/>
+              <a:t>alpha</a:t>
+            </a:r>
+            <a:r>
+              <a:rPr/>
+              <a:t> </a:t>
+            </a:r>
+            <a:r>
+              <a:rPr/>
+              <a:t>level</a:t>
+            </a:r>
+            <a:r>
+              <a:rPr/>
+              <a:t> </a:t>
+            </a:r>
+            <a:r>
+              <a:rPr/>
+              <a:t>of</a:t>
+            </a:r>
+            <a:r>
+              <a:rPr/>
+              <a:t> </a:t>
+            </a:r>
+            <a:r>
+              <a:rPr/>
+              <a:t>0.05</a:t>
+            </a:r>
+            <a:r>
+              <a:rPr/>
+              <a:t> </a:t>
+            </a:r>
+            <a:r>
+              <a:rPr/>
+              <a:t>to</a:t>
+            </a:r>
+            <a:r>
+              <a:rPr/>
+              <a:t> </a:t>
+            </a:r>
+            <a:r>
+              <a:rPr/>
+              <a:t>decide</a:t>
+            </a:r>
+            <a:r>
+              <a:rPr/>
+              <a:t> </a:t>
+            </a:r>
+            <a:r>
+              <a:rPr/>
+              <a:t>what</a:t>
+            </a:r>
+            <a:r>
+              <a:rPr/>
+              <a:t> </a:t>
+            </a:r>
+            <a:r>
+              <a:rPr/>
+              <a:t>is</a:t>
+            </a:r>
+            <a:r>
+              <a:rPr/>
+              <a:t> </a:t>
+            </a:r>
+            <a:r>
+              <a:rPr/>
+              <a:t>statistically</a:t>
+            </a:r>
+            <a:r>
+              <a:rPr/>
+              <a:t> </a:t>
+            </a:r>
+            <a:r>
+              <a:rPr/>
+              <a:t>significant</a:t>
+            </a:r>
+            <a:r>
+              <a:rPr/>
+              <a:t> </a:t>
+            </a:r>
+            <a:r>
+              <a:rPr/>
+              <a:t>(which</a:t>
+            </a:r>
+            <a:r>
+              <a:rPr/>
+              <a:t> </a:t>
+            </a:r>
+            <a:r>
+              <a:rPr/>
+              <a:t>you</a:t>
+            </a:r>
+            <a:r>
+              <a:rPr/>
+              <a:t> </a:t>
+            </a:r>
+            <a:r>
+              <a:rPr/>
+              <a:t>do</a:t>
+            </a:r>
+            <a:r>
+              <a:rPr/>
+              <a:t> </a:t>
+            </a:r>
+            <a:r>
+              <a:rPr/>
+              <a:t>99.99%</a:t>
+            </a:r>
+            <a:r>
+              <a:rPr/>
+              <a:t> </a:t>
+            </a:r>
+            <a:r>
+              <a:rPr/>
+              <a:t>of</a:t>
+            </a:r>
+            <a:r>
+              <a:rPr/>
+              <a:t> </a:t>
+            </a:r>
+            <a:r>
+              <a:rPr/>
+              <a:t>the</a:t>
+            </a:r>
+            <a:r>
+              <a:rPr/>
+              <a:t> </a:t>
+            </a:r>
+            <a:r>
+              <a:rPr/>
+              <a:t>time).</a:t>
+            </a:r>
+          </a:p>
+        </p:txBody>
+      </p:sp>
+      <p:sp>
+        <p:nvSpPr>
+          <p:cNvPr id="4" name="Slide Number Placeholder 3"/>
+          <p:cNvSpPr>
+            <a:spLocks noGrp="1"/>
+          </p:cNvSpPr>
+          <p:nvPr>
+            <p:ph type="sldNum" sz="quarter" idx="10"/>
+          </p:nvPr>
+        </p:nvSpPr>
+        <p:spPr/>
+        <p:txBody>
+          <a:bodyPr/>
+          <a:lstStyle/>
+          <a:p>
+            <a:fld id="{18BDFEC3-8487-43E8-A154-7C12CBC1FFF2}" type="slidenum">
+              <a:rPr lang="en-US"/>
+              <a:t>31</a:t>
+            </a:fld>
+            <a:endParaRPr lang="en-US"/>
+          </a:p>
+        </p:txBody>
+      </p:sp>
+    </p:spTree>
+  </p:cSld>
+</p:notes>
+</file>
+
+<file path=ppt/notesSlides/notesSlide31.xml><?xml version="1.0" encoding="utf-8"?>
+<p:notes xmlns:a="http://schemas.openxmlformats.org/drawingml/2006/main" xmlns:r="http://schemas.openxmlformats.org/officeDocument/2006/relationships" xmlns:p="http://schemas.openxmlformats.org/presentationml/2006/main">
+  <p:cSld>
+    <p:spTree>
+      <p:nvGrpSpPr>
+        <p:cNvPr id="1" name=""/>
+        <p:cNvGrpSpPr/>
+        <p:nvPr/>
+      </p:nvGrpSpPr>
+      <p:grpSpPr>
+        <a:xfrm>
+          <a:off x="0" y="0"/>
+          <a:ext cx="0" cy="0"/>
+          <a:chOff x="0" y="0"/>
+          <a:chExt cx="0" cy="0"/>
+        </a:xfrm>
+      </p:grpSpPr>
+      <p:sp>
+        <p:nvSpPr>
+          <p:cNvPr id="2" name="Slide Image Placeholder 1"/>
+          <p:cNvSpPr>
+            <a:spLocks noGrp="1" noRot="1" noChangeAspect="1"/>
+          </p:cNvSpPr>
+          <p:nvPr>
+            <p:ph type="sldImg"/>
+          </p:nvPr>
+        </p:nvSpPr>
+        <p:spPr/>
+      </p:sp>
+      <p:sp>
+        <p:nvSpPr>
+          <p:cNvPr id="3" name="Notes Placeholder 2"/>
+          <p:cNvSpPr>
+            <a:spLocks noGrp="1"/>
+          </p:cNvSpPr>
+          <p:nvPr>
+            <p:ph type="body" idx="1"/>
+          </p:nvPr>
+        </p:nvSpPr>
+        <p:spPr/>
+        <p:txBody>
+          <a:bodyPr/>
+          <a:lstStyle/>
+          <a:p>
+            <a:pPr lvl="0" marL="0" indent="0">
+              <a:buNone/>
+            </a:pPr>
+            <a:r>
+              <a:rPr/>
+              <a:t>The</a:t>
+            </a:r>
+            <a:r>
+              <a:rPr/>
+              <a:t> </a:t>
+            </a:r>
+            <a:r>
+              <a:rPr/>
+              <a:t>methods</a:t>
+            </a:r>
+            <a:r>
+              <a:rPr/>
+              <a:t> </a:t>
+            </a:r>
+            <a:r>
+              <a:rPr/>
+              <a:t>that</a:t>
+            </a:r>
+            <a:r>
+              <a:rPr/>
+              <a:t> </a:t>
+            </a:r>
+            <a:r>
+              <a:rPr/>
+              <a:t>you</a:t>
+            </a:r>
+            <a:r>
+              <a:rPr/>
+              <a:t> </a:t>
+            </a:r>
+            <a:r>
+              <a:rPr/>
+              <a:t>document</a:t>
+            </a:r>
+            <a:r>
+              <a:rPr/>
+              <a:t> </a:t>
+            </a:r>
+            <a:r>
+              <a:rPr/>
+              <a:t>in</a:t>
+            </a:r>
+            <a:r>
+              <a:rPr/>
+              <a:t> </a:t>
+            </a:r>
+            <a:r>
+              <a:rPr/>
+              <a:t>a</a:t>
+            </a:r>
+            <a:r>
+              <a:rPr/>
+              <a:t> </a:t>
+            </a:r>
+            <a:r>
+              <a:rPr/>
+              <a:t>qualitative</a:t>
+            </a:r>
+            <a:r>
+              <a:rPr/>
+              <a:t> </a:t>
+            </a:r>
+            <a:r>
+              <a:rPr/>
+              <a:t>study</a:t>
+            </a:r>
+            <a:r>
+              <a:rPr/>
+              <a:t> </a:t>
+            </a:r>
+            <a:r>
+              <a:rPr/>
+              <a:t>are</a:t>
+            </a:r>
+            <a:r>
+              <a:rPr/>
+              <a:t> </a:t>
+            </a:r>
+            <a:r>
+              <a:rPr/>
+              <a:t>quite</a:t>
+            </a:r>
+            <a:r>
+              <a:rPr/>
+              <a:t> </a:t>
+            </a:r>
+            <a:r>
+              <a:rPr/>
+              <a:t>different</a:t>
+            </a:r>
+            <a:r>
+              <a:rPr/>
+              <a:t> </a:t>
+            </a:r>
+            <a:r>
+              <a:rPr/>
+              <a:t>than</a:t>
+            </a:r>
+            <a:r>
+              <a:rPr/>
+              <a:t> </a:t>
+            </a:r>
+            <a:r>
+              <a:rPr/>
+              <a:t>those</a:t>
+            </a:r>
+            <a:r>
+              <a:rPr/>
+              <a:t> </a:t>
+            </a:r>
+            <a:r>
+              <a:rPr/>
+              <a:t>you</a:t>
+            </a:r>
+            <a:r>
+              <a:rPr/>
+              <a:t> </a:t>
+            </a:r>
+            <a:r>
+              <a:rPr/>
+              <a:t>use</a:t>
+            </a:r>
+            <a:r>
+              <a:rPr/>
+              <a:t> </a:t>
+            </a:r>
+            <a:r>
+              <a:rPr/>
+              <a:t>for</a:t>
+            </a:r>
+            <a:r>
+              <a:rPr/>
+              <a:t> </a:t>
+            </a:r>
+            <a:r>
+              <a:rPr/>
+              <a:t>a</a:t>
+            </a:r>
+            <a:r>
+              <a:rPr/>
+              <a:t> </a:t>
+            </a:r>
+            <a:r>
+              <a:rPr/>
+              <a:t>qualitative</a:t>
+            </a:r>
+            <a:r>
+              <a:rPr/>
+              <a:t> </a:t>
+            </a:r>
+            <a:r>
+              <a:rPr/>
+              <a:t>study.</a:t>
+            </a:r>
+            <a:r>
+              <a:rPr/>
+              <a:t> </a:t>
+            </a:r>
+            <a:r>
+              <a:rPr/>
+              <a:t>Here</a:t>
+            </a:r>
+            <a:r>
+              <a:rPr/>
+              <a:t> </a:t>
+            </a:r>
+            <a:r>
+              <a:rPr/>
+              <a:t>are</a:t>
+            </a:r>
+            <a:r>
+              <a:rPr/>
+              <a:t> </a:t>
+            </a:r>
+            <a:r>
+              <a:rPr/>
+              <a:t>some</a:t>
+            </a:r>
+            <a:r>
+              <a:rPr/>
+              <a:t> </a:t>
+            </a:r>
+            <a:r>
+              <a:rPr/>
+              <a:t>of</a:t>
+            </a:r>
+            <a:r>
+              <a:rPr/>
+              <a:t> </a:t>
+            </a:r>
+            <a:r>
+              <a:rPr/>
+              <a:t>the</a:t>
+            </a:r>
+            <a:r>
+              <a:rPr/>
+              <a:t> </a:t>
+            </a:r>
+            <a:r>
+              <a:rPr/>
+              <a:t>elements</a:t>
+            </a:r>
+            <a:r>
+              <a:rPr/>
+              <a:t> </a:t>
+            </a:r>
+            <a:r>
+              <a:rPr/>
+              <a:t>that</a:t>
+            </a:r>
+            <a:r>
+              <a:rPr/>
+              <a:t> </a:t>
+            </a:r>
+            <a:r>
+              <a:rPr/>
+              <a:t>you</a:t>
+            </a:r>
+            <a:r>
+              <a:rPr/>
+              <a:t> </a:t>
+            </a:r>
+            <a:r>
+              <a:rPr/>
+              <a:t>need</a:t>
+            </a:r>
+            <a:r>
+              <a:rPr/>
+              <a:t> </a:t>
+            </a:r>
+            <a:r>
+              <a:rPr/>
+              <a:t>to</a:t>
+            </a:r>
+            <a:r>
+              <a:rPr/>
+              <a:t> </a:t>
+            </a:r>
+            <a:r>
+              <a:rPr/>
+              <a:t>talk</a:t>
+            </a:r>
+            <a:r>
+              <a:rPr/>
+              <a:t> </a:t>
+            </a:r>
+            <a:r>
+              <a:rPr/>
+              <a:t>about.</a:t>
+            </a:r>
+          </a:p>
+        </p:txBody>
+      </p:sp>
+      <p:sp>
+        <p:nvSpPr>
+          <p:cNvPr id="4" name="Slide Number Placeholder 3"/>
+          <p:cNvSpPr>
+            <a:spLocks noGrp="1"/>
+          </p:cNvSpPr>
+          <p:nvPr>
+            <p:ph type="sldNum" sz="quarter" idx="10"/>
+          </p:nvPr>
+        </p:nvSpPr>
+        <p:spPr/>
+        <p:txBody>
+          <a:bodyPr/>
+          <a:lstStyle/>
+          <a:p>
+            <a:fld id="{18BDFEC3-8487-43E8-A154-7C12CBC1FFF2}" type="slidenum">
+              <a:rPr lang="en-US"/>
+              <a:t>33</a:t>
             </a:fld>
             <a:endParaRPr lang="en-US"/>
           </a:p>
@@ -32525,7 +36116,7 @@
             <a:spLocks noGrp="1"/>
           </p:cNvSpPr>
           <p:nvPr>
-            <p:ph type="subTitle" idx="1"/>
+            <p:ph idx="1" type="subTitle"/>
           </p:nvPr>
         </p:nvSpPr>
         <p:spPr>
@@ -32600,7 +36191,7 @@
             </a:pPr>
             <a:r>
               <a:rPr/>
-              <a:t>Breask</a:t>
+              <a:t>Break</a:t>
             </a:r>
             <a:r>
               <a:rPr/>
@@ -34832,7 +38423,55 @@
             </a:pPr>
             <a:r>
               <a:rPr/>
-              <a:t>Conclusion</a:t>
+              <a:t>What</a:t>
+            </a:r>
+            <a:r>
+              <a:rPr/>
+              <a:t> </a:t>
+            </a:r>
+            <a:r>
+              <a:rPr/>
+              <a:t>purpose</a:t>
+            </a:r>
+            <a:r>
+              <a:rPr/>
+              <a:t> </a:t>
+            </a:r>
+            <a:r>
+              <a:rPr/>
+              <a:t>does</a:t>
+            </a:r>
+            <a:r>
+              <a:rPr/>
+              <a:t> </a:t>
+            </a:r>
+            <a:r>
+              <a:rPr/>
+              <a:t>a</a:t>
+            </a:r>
+            <a:r>
+              <a:rPr/>
+              <a:t> </a:t>
+            </a:r>
+            <a:r>
+              <a:rPr/>
+              <a:t>methods</a:t>
+            </a:r>
+            <a:r>
+              <a:rPr/>
+              <a:t> </a:t>
+            </a:r>
+            <a:r>
+              <a:rPr/>
+              <a:t>section</a:t>
+            </a:r>
+            <a:r>
+              <a:rPr/>
+              <a:t> </a:t>
+            </a:r>
+            <a:r>
+              <a:rPr/>
+              <a:t>serve?</a:t>
             </a:r>
           </a:p>
         </p:txBody>
@@ -34855,35 +38494,538 @@
             <a:pPr lvl="1"/>
             <a:r>
               <a:rPr/>
-              <a:t>What have you learned?</a:t>
+              <a:t>Assessment of the quality of your research</a:t>
             </a:r>
           </a:p>
           <a:p>
             <a:pPr lvl="2"/>
             <a:r>
               <a:rPr/>
-              <a:t>Types of probability samples</a:t>
+              <a:t>Brag here about your rigor</a:t>
             </a:r>
           </a:p>
           <a:p>
             <a:pPr lvl="2"/>
             <a:r>
               <a:rPr/>
-              <a:t>How to draw a random sample</a:t>
+              <a:t>Save limitations for discussion</a:t>
+            </a:r>
+          </a:p>
+          <a:p>
+            <a:pPr lvl="1"/>
+            <a:r>
+              <a:rPr/>
+              <a:t>Allow others to replicate/extend</a:t>
             </a:r>
           </a:p>
           <a:p>
             <a:pPr lvl="2"/>
             <a:r>
               <a:rPr/>
-              <a:t>Different types of non-probability samples</a:t>
+              <a:t>Non-obvious details</a:t>
+            </a:r>
+          </a:p>
+        </p:txBody>
+      </p:sp>
+    </p:spTree>
+  </p:cSld>
+</p:sld>
+</file>
+
+<file path=ppt/slides/slide26.xml><?xml version="1.0" encoding="utf-8"?>
+<p:sld xmlns:a="http://schemas.openxmlformats.org/drawingml/2006/main" xmlns:r="http://schemas.openxmlformats.org/officeDocument/2006/relationships" xmlns:p="http://schemas.openxmlformats.org/presentationml/2006/main">
+  <p:cSld>
+    <p:spTree>
+      <p:nvGrpSpPr>
+        <p:cNvPr id="1" name=""/>
+        <p:cNvGrpSpPr/>
+        <p:nvPr/>
+      </p:nvGrpSpPr>
+      <p:grpSpPr>
+        <a:xfrm>
+          <a:off x="0" y="0"/>
+          <a:ext cx="0" cy="0"/>
+          <a:chOff x="0" y="0"/>
+          <a:chExt cx="0" cy="0"/>
+        </a:xfrm>
+      </p:grpSpPr>
+      <p:sp>
+        <p:nvSpPr>
+          <p:cNvPr id="2" name="Title 1"/>
+          <p:cNvSpPr>
+            <a:spLocks noGrp="1"/>
+          </p:cNvSpPr>
+          <p:nvPr>
+            <p:ph type="title"/>
+          </p:nvPr>
+        </p:nvSpPr>
+        <p:spPr/>
+        <p:txBody>
+          <a:bodyPr/>
+          <a:lstStyle/>
+          <a:p>
+            <a:pPr lvl="0" marL="0" indent="0">
+              <a:buNone/>
+            </a:pPr>
+            <a:r>
+              <a:rPr/>
+              <a:t>What</a:t>
+            </a:r>
+            <a:r>
+              <a:rPr/>
+              <a:t> </a:t>
+            </a:r>
+            <a:r>
+              <a:rPr/>
+              <a:t>should</a:t>
+            </a:r>
+            <a:r>
+              <a:rPr/>
+              <a:t> </a:t>
+            </a:r>
+            <a:r>
+              <a:rPr/>
+              <a:t>not</a:t>
+            </a:r>
+            <a:r>
+              <a:rPr/>
+              <a:t> </a:t>
+            </a:r>
+            <a:r>
+              <a:rPr/>
+              <a:t>be</a:t>
+            </a:r>
+            <a:r>
+              <a:rPr/>
+              <a:t> </a:t>
+            </a:r>
+            <a:r>
+              <a:rPr/>
+              <a:t>included</a:t>
+            </a:r>
+            <a:r>
+              <a:rPr/>
+              <a:t> </a:t>
+            </a:r>
+            <a:r>
+              <a:rPr/>
+              <a:t>in</a:t>
+            </a:r>
+            <a:r>
+              <a:rPr/>
+              <a:t> </a:t>
+            </a:r>
+            <a:r>
+              <a:rPr/>
+              <a:t>the</a:t>
+            </a:r>
+            <a:r>
+              <a:rPr/>
+              <a:t> </a:t>
+            </a:r>
+            <a:r>
+              <a:rPr/>
+              <a:t>methods</a:t>
+            </a:r>
+            <a:r>
+              <a:rPr/>
+              <a:t> </a:t>
+            </a:r>
+            <a:r>
+              <a:rPr/>
+              <a:t>section</a:t>
+            </a:r>
+          </a:p>
+        </p:txBody>
+      </p:sp>
+      <p:sp>
+        <p:nvSpPr>
+          <p:cNvPr id="3" name="Content Placeholder 2"/>
+          <p:cNvSpPr>
+            <a:spLocks noGrp="1"/>
+          </p:cNvSpPr>
+          <p:nvPr>
+            <p:ph idx="1"/>
+          </p:nvPr>
+        </p:nvSpPr>
+        <p:spPr/>
+        <p:txBody>
+          <a:bodyPr/>
+          <a:lstStyle/>
+          <a:p>
+            <a:pPr lvl="1"/>
+            <a:r>
+              <a:rPr/>
+              <a:t>“The Methods section should include only information that was available at the time the plan or protocol for the study was being written; all information obtained during the study belongs in the Results section.”</a:t>
             </a:r>
           </a:p>
           <a:p>
             <a:pPr lvl="2"/>
             <a:r>
               <a:rPr/>
-              <a:t>How to allocate treatments randomly</a:t>
+              <a:t>Uniform requirements for manuscripts submitted to biomedical journals: Writing and editing for biomedical publication. J Pharmacol Pharmacother. 2010;1(1):42–58.</a:t>
+            </a:r>
+          </a:p>
+          <a:p>
+            <a:pPr lvl="1"/>
+            <a:r>
+              <a:rPr/>
+              <a:t>Exceptions</a:t>
+            </a:r>
+          </a:p>
+          <a:p>
+            <a:pPr lvl="2"/>
+            <a:r>
+              <a:rPr/>
+              <a:t>Patient counts, Dropout rates, Protocol changes</a:t>
+            </a:r>
+          </a:p>
+        </p:txBody>
+      </p:sp>
+    </p:spTree>
+  </p:cSld>
+</p:sld>
+</file>
+
+<file path=ppt/slides/slide27.xml><?xml version="1.0" encoding="utf-8"?>
+<p:sld xmlns:a="http://schemas.openxmlformats.org/drawingml/2006/main" xmlns:r="http://schemas.openxmlformats.org/officeDocument/2006/relationships" xmlns:p="http://schemas.openxmlformats.org/presentationml/2006/main">
+  <p:cSld>
+    <p:spTree>
+      <p:nvGrpSpPr>
+        <p:cNvPr id="1" name=""/>
+        <p:cNvGrpSpPr/>
+        <p:nvPr/>
+      </p:nvGrpSpPr>
+      <p:grpSpPr>
+        <a:xfrm>
+          <a:off x="0" y="0"/>
+          <a:ext cx="0" cy="0"/>
+          <a:chOff x="0" y="0"/>
+          <a:chExt cx="0" cy="0"/>
+        </a:xfrm>
+      </p:grpSpPr>
+      <p:sp>
+        <p:nvSpPr>
+          <p:cNvPr id="2" name="Title 1"/>
+          <p:cNvSpPr>
+            <a:spLocks noGrp="1"/>
+          </p:cNvSpPr>
+          <p:nvPr>
+            <p:ph type="title"/>
+          </p:nvPr>
+        </p:nvSpPr>
+        <p:spPr/>
+        <p:txBody>
+          <a:bodyPr/>
+          <a:lstStyle/>
+          <a:p>
+            <a:pPr lvl="0" marL="0" indent="0">
+              <a:buNone/>
+            </a:pPr>
+            <a:r>
+              <a:rPr/>
+              <a:t>What</a:t>
+            </a:r>
+            <a:r>
+              <a:rPr/>
+              <a:t> </a:t>
+            </a:r>
+            <a:r>
+              <a:rPr/>
+              <a:t>belongs</a:t>
+            </a:r>
+            <a:r>
+              <a:rPr/>
+              <a:t> </a:t>
+            </a:r>
+            <a:r>
+              <a:rPr/>
+              <a:t>in</a:t>
+            </a:r>
+            <a:r>
+              <a:rPr/>
+              <a:t> </a:t>
+            </a:r>
+            <a:r>
+              <a:rPr/>
+              <a:t>the</a:t>
+            </a:r>
+            <a:r>
+              <a:rPr/>
+              <a:t> </a:t>
+            </a:r>
+            <a:r>
+              <a:rPr/>
+              <a:t>methods</a:t>
+            </a:r>
+            <a:r>
+              <a:rPr/>
+              <a:t> </a:t>
+            </a:r>
+            <a:r>
+              <a:rPr/>
+              <a:t>section</a:t>
+            </a:r>
+          </a:p>
+        </p:txBody>
+      </p:sp>
+      <p:sp>
+        <p:nvSpPr>
+          <p:cNvPr id="3" name="Content Placeholder 2"/>
+          <p:cNvSpPr>
+            <a:spLocks noGrp="1"/>
+          </p:cNvSpPr>
+          <p:nvPr>
+            <p:ph idx="1"/>
+          </p:nvPr>
+        </p:nvSpPr>
+        <p:spPr/>
+        <p:txBody>
+          <a:bodyPr/>
+          <a:lstStyle/>
+          <a:p>
+            <a:pPr lvl="1"/>
+            <a:r>
+              <a:rPr/>
+              <a:t>Every methods section is different</a:t>
+            </a:r>
+          </a:p>
+          <a:p>
+            <a:pPr lvl="1"/>
+            <a:r>
+              <a:rPr/>
+              <a:t>General structure</a:t>
+            </a:r>
+          </a:p>
+          <a:p>
+            <a:pPr lvl="2"/>
+            <a:r>
+              <a:rPr/>
+              <a:t>Participants</a:t>
+            </a:r>
+          </a:p>
+          <a:p>
+            <a:pPr lvl="2"/>
+            <a:r>
+              <a:rPr/>
+              <a:t>Materials</a:t>
+            </a:r>
+          </a:p>
+          <a:p>
+            <a:pPr lvl="2"/>
+            <a:r>
+              <a:rPr/>
+              <a:t>Procedures</a:t>
+            </a:r>
+          </a:p>
+          <a:p>
+            <a:pPr lvl="2"/>
+            <a:r>
+              <a:rPr/>
+              <a:t>Measures</a:t>
+            </a:r>
+          </a:p>
+          <a:p>
+            <a:pPr lvl="2"/>
+            <a:r>
+              <a:rPr/>
+              <a:t>Analysis</a:t>
+            </a:r>
+          </a:p>
+        </p:txBody>
+      </p:sp>
+    </p:spTree>
+  </p:cSld>
+</p:sld>
+</file>
+
+<file path=ppt/slides/slide28.xml><?xml version="1.0" encoding="utf-8"?>
+<p:sld xmlns:a="http://schemas.openxmlformats.org/drawingml/2006/main" xmlns:r="http://schemas.openxmlformats.org/officeDocument/2006/relationships" xmlns:p="http://schemas.openxmlformats.org/presentationml/2006/main">
+  <p:cSld>
+    <p:spTree>
+      <p:nvGrpSpPr>
+        <p:cNvPr id="1" name=""/>
+        <p:cNvGrpSpPr/>
+        <p:nvPr/>
+      </p:nvGrpSpPr>
+      <p:grpSpPr>
+        <a:xfrm>
+          <a:off x="0" y="0"/>
+          <a:ext cx="0" cy="0"/>
+          <a:chOff x="0" y="0"/>
+          <a:chExt cx="0" cy="0"/>
+        </a:xfrm>
+      </p:grpSpPr>
+      <p:sp>
+        <p:nvSpPr>
+          <p:cNvPr id="2" name="Title 1"/>
+          <p:cNvSpPr>
+            <a:spLocks noGrp="1"/>
+          </p:cNvSpPr>
+          <p:nvPr>
+            <p:ph type="title"/>
+          </p:nvPr>
+        </p:nvSpPr>
+        <p:spPr/>
+        <p:txBody>
+          <a:bodyPr/>
+          <a:lstStyle/>
+          <a:p>
+            <a:pPr lvl="0" marL="0" indent="0">
+              <a:buNone/>
+            </a:pPr>
+            <a:r>
+              <a:rPr/>
+              <a:t>Participants</a:t>
+            </a:r>
+          </a:p>
+        </p:txBody>
+      </p:sp>
+      <p:sp>
+        <p:nvSpPr>
+          <p:cNvPr id="3" name="Content Placeholder 2"/>
+          <p:cNvSpPr>
+            <a:spLocks noGrp="1"/>
+          </p:cNvSpPr>
+          <p:nvPr>
+            <p:ph idx="1"/>
+          </p:nvPr>
+        </p:nvSpPr>
+        <p:spPr/>
+        <p:txBody>
+          <a:bodyPr/>
+          <a:lstStyle/>
+          <a:p>
+            <a:pPr lvl="1"/>
+            <a:r>
+              <a:rPr/>
+              <a:t>Where you will find your participants</a:t>
+            </a:r>
+          </a:p>
+          <a:p>
+            <a:pPr lvl="1"/>
+            <a:r>
+              <a:rPr/>
+              <a:t>Inclusion/exclusion criteria</a:t>
+            </a:r>
+          </a:p>
+          <a:p>
+            <a:pPr lvl="1"/>
+            <a:r>
+              <a:rPr/>
+              <a:t>Efforts to insure representativeness</a:t>
+            </a:r>
+          </a:p>
+        </p:txBody>
+      </p:sp>
+    </p:spTree>
+  </p:cSld>
+</p:sld>
+</file>
+
+<file path=ppt/slides/slide29.xml><?xml version="1.0" encoding="utf-8"?>
+<p:sld xmlns:a="http://schemas.openxmlformats.org/drawingml/2006/main" xmlns:r="http://schemas.openxmlformats.org/officeDocument/2006/relationships" xmlns:p="http://schemas.openxmlformats.org/presentationml/2006/main">
+  <p:cSld>
+    <p:spTree>
+      <p:nvGrpSpPr>
+        <p:cNvPr id="1" name=""/>
+        <p:cNvGrpSpPr/>
+        <p:nvPr/>
+      </p:nvGrpSpPr>
+      <p:grpSpPr>
+        <a:xfrm>
+          <a:off x="0" y="0"/>
+          <a:ext cx="0" cy="0"/>
+          <a:chOff x="0" y="0"/>
+          <a:chExt cx="0" cy="0"/>
+        </a:xfrm>
+      </p:grpSpPr>
+      <p:sp>
+        <p:nvSpPr>
+          <p:cNvPr id="2" name="Title 1"/>
+          <p:cNvSpPr>
+            <a:spLocks noGrp="1"/>
+          </p:cNvSpPr>
+          <p:nvPr>
+            <p:ph type="title"/>
+          </p:nvPr>
+        </p:nvSpPr>
+        <p:spPr/>
+        <p:txBody>
+          <a:bodyPr/>
+          <a:lstStyle/>
+          <a:p>
+            <a:pPr lvl="0" marL="0" indent="0">
+              <a:buNone/>
+            </a:pPr>
+            <a:r>
+              <a:rPr/>
+              <a:t>Materials/Procedures</a:t>
+            </a:r>
+          </a:p>
+        </p:txBody>
+      </p:sp>
+      <p:sp>
+        <p:nvSpPr>
+          <p:cNvPr id="3" name="Content Placeholder 2"/>
+          <p:cNvSpPr>
+            <a:spLocks noGrp="1"/>
+          </p:cNvSpPr>
+          <p:nvPr>
+            <p:ph idx="1"/>
+          </p:nvPr>
+        </p:nvSpPr>
+        <p:spPr/>
+        <p:txBody>
+          <a:bodyPr/>
+          <a:lstStyle/>
+          <a:p>
+            <a:pPr lvl="1"/>
+            <a:r>
+              <a:rPr/>
+              <a:t>Only document the non-routine</a:t>
+            </a:r>
+          </a:p>
+          <a:p>
+            <a:pPr lvl="1"/>
+            <a:r>
+              <a:rPr/>
+              <a:t>Materials</a:t>
+            </a:r>
+          </a:p>
+          <a:p>
+            <a:pPr lvl="2"/>
+            <a:r>
+              <a:rPr/>
+              <a:t>Chemicals</a:t>
+            </a:r>
+          </a:p>
+          <a:p>
+            <a:pPr lvl="2"/>
+            <a:r>
+              <a:rPr/>
+              <a:t>Include company and location</a:t>
+            </a:r>
+          </a:p>
+          <a:p>
+            <a:pPr lvl="1"/>
+            <a:r>
+              <a:rPr/>
+              <a:t>Procedures</a:t>
+            </a:r>
+          </a:p>
+          <a:p>
+            <a:pPr lvl="2"/>
+            <a:r>
+              <a:rPr/>
+              <a:t>Running complex equipment</a:t>
+            </a:r>
+          </a:p>
+          <a:p>
+            <a:pPr lvl="2"/>
+            <a:r>
+              <a:rPr/>
+              <a:t>Multiple step laboratory methods</a:t>
             </a:r>
           </a:p>
         </p:txBody>
@@ -35020,6 +39162,575 @@
             <a:r>
               <a:rPr/>
               <a:t>Diagnosis</a:t>
+            </a:r>
+          </a:p>
+        </p:txBody>
+      </p:sp>
+    </p:spTree>
+  </p:cSld>
+</p:sld>
+</file>
+
+<file path=ppt/slides/slide30.xml><?xml version="1.0" encoding="utf-8"?>
+<p:sld xmlns:a="http://schemas.openxmlformats.org/drawingml/2006/main" xmlns:r="http://schemas.openxmlformats.org/officeDocument/2006/relationships" xmlns:p="http://schemas.openxmlformats.org/presentationml/2006/main">
+  <p:cSld>
+    <p:spTree>
+      <p:nvGrpSpPr>
+        <p:cNvPr id="1" name=""/>
+        <p:cNvGrpSpPr/>
+        <p:nvPr/>
+      </p:nvGrpSpPr>
+      <p:grpSpPr>
+        <a:xfrm>
+          <a:off x="0" y="0"/>
+          <a:ext cx="0" cy="0"/>
+          <a:chOff x="0" y="0"/>
+          <a:chExt cx="0" cy="0"/>
+        </a:xfrm>
+      </p:grpSpPr>
+      <p:sp>
+        <p:nvSpPr>
+          <p:cNvPr id="2" name="Title 1"/>
+          <p:cNvSpPr>
+            <a:spLocks noGrp="1"/>
+          </p:cNvSpPr>
+          <p:nvPr>
+            <p:ph type="title"/>
+          </p:nvPr>
+        </p:nvSpPr>
+        <p:spPr/>
+        <p:txBody>
+          <a:bodyPr/>
+          <a:lstStyle/>
+          <a:p>
+            <a:pPr lvl="0" marL="0" indent="0">
+              <a:buNone/>
+            </a:pPr>
+            <a:r>
+              <a:rPr/>
+              <a:t>Measures</a:t>
+            </a:r>
+          </a:p>
+        </p:txBody>
+      </p:sp>
+      <p:sp>
+        <p:nvSpPr>
+          <p:cNvPr id="3" name="Content Placeholder 2"/>
+          <p:cNvSpPr>
+            <a:spLocks noGrp="1"/>
+          </p:cNvSpPr>
+          <p:nvPr>
+            <p:ph idx="1"/>
+          </p:nvPr>
+        </p:nvSpPr>
+        <p:spPr/>
+        <p:txBody>
+          <a:bodyPr/>
+          <a:lstStyle/>
+          <a:p>
+            <a:pPr lvl="1"/>
+            <a:r>
+              <a:rPr/>
+              <a:t>Outcome variables</a:t>
+            </a:r>
+          </a:p>
+          <a:p>
+            <a:pPr lvl="1"/>
+            <a:r>
+              <a:rPr/>
+              <a:t>Independent variables</a:t>
+            </a:r>
+          </a:p>
+          <a:p>
+            <a:pPr lvl="1"/>
+            <a:r>
+              <a:rPr/>
+              <a:t>Covariates</a:t>
+            </a:r>
+          </a:p>
+          <a:p>
+            <a:pPr lvl="1"/>
+            <a:r>
+              <a:rPr/>
+              <a:t>Validity/reliability</a:t>
+            </a:r>
+          </a:p>
+        </p:txBody>
+      </p:sp>
+    </p:spTree>
+  </p:cSld>
+</p:sld>
+</file>
+
+<file path=ppt/slides/slide31.xml><?xml version="1.0" encoding="utf-8"?>
+<p:sld xmlns:a="http://schemas.openxmlformats.org/drawingml/2006/main" xmlns:r="http://schemas.openxmlformats.org/officeDocument/2006/relationships" xmlns:p="http://schemas.openxmlformats.org/presentationml/2006/main">
+  <p:cSld>
+    <p:spTree>
+      <p:nvGrpSpPr>
+        <p:cNvPr id="1" name=""/>
+        <p:cNvGrpSpPr/>
+        <p:nvPr/>
+      </p:nvGrpSpPr>
+      <p:grpSpPr>
+        <a:xfrm>
+          <a:off x="0" y="0"/>
+          <a:ext cx="0" cy="0"/>
+          <a:chOff x="0" y="0"/>
+          <a:chExt cx="0" cy="0"/>
+        </a:xfrm>
+      </p:grpSpPr>
+      <p:sp>
+        <p:nvSpPr>
+          <p:cNvPr id="2" name="Title 1"/>
+          <p:cNvSpPr>
+            <a:spLocks noGrp="1"/>
+          </p:cNvSpPr>
+          <p:nvPr>
+            <p:ph type="title"/>
+          </p:nvPr>
+        </p:nvSpPr>
+        <p:spPr/>
+        <p:txBody>
+          <a:bodyPr/>
+          <a:lstStyle/>
+          <a:p>
+            <a:pPr lvl="0" marL="0" indent="0">
+              <a:buNone/>
+            </a:pPr>
+            <a:r>
+              <a:rPr/>
+              <a:t>Analysis</a:t>
+            </a:r>
+          </a:p>
+        </p:txBody>
+      </p:sp>
+      <p:sp>
+        <p:nvSpPr>
+          <p:cNvPr id="3" name="Content Placeholder 2"/>
+          <p:cNvSpPr>
+            <a:spLocks noGrp="1"/>
+          </p:cNvSpPr>
+          <p:nvPr>
+            <p:ph idx="1"/>
+          </p:nvPr>
+        </p:nvSpPr>
+        <p:spPr/>
+        <p:txBody>
+          <a:bodyPr/>
+          <a:lstStyle/>
+          <a:p>
+            <a:pPr lvl="1"/>
+            <a:r>
+              <a:rPr/>
+              <a:t>Research hypotheses / questions</a:t>
+            </a:r>
+          </a:p>
+          <a:p>
+            <a:pPr lvl="1"/>
+            <a:r>
+              <a:rPr/>
+              <a:t>Sample size justification</a:t>
+            </a:r>
+          </a:p>
+          <a:p>
+            <a:pPr lvl="1"/>
+            <a:r>
+              <a:rPr/>
+              <a:t>Descriptive methods</a:t>
+            </a:r>
+          </a:p>
+          <a:p>
+            <a:pPr lvl="2"/>
+            <a:r>
+              <a:rPr/>
+              <a:t>Boilerplate: “Continuous variables were summarized as means and SDs, and categorical variables were summarized as percentages.” Saleem 2019.</a:t>
+            </a:r>
+          </a:p>
+        </p:txBody>
+      </p:sp>
+    </p:spTree>
+  </p:cSld>
+</p:sld>
+</file>
+
+<file path=ppt/slides/slide32.xml><?xml version="1.0" encoding="utf-8"?>
+<p:sld xmlns:a="http://schemas.openxmlformats.org/drawingml/2006/main" xmlns:r="http://schemas.openxmlformats.org/officeDocument/2006/relationships" xmlns:p="http://schemas.openxmlformats.org/presentationml/2006/main">
+  <p:cSld>
+    <p:spTree>
+      <p:nvGrpSpPr>
+        <p:cNvPr id="1" name=""/>
+        <p:cNvGrpSpPr/>
+        <p:nvPr/>
+      </p:nvGrpSpPr>
+      <p:grpSpPr>
+        <a:xfrm>
+          <a:off x="0" y="0"/>
+          <a:ext cx="0" cy="0"/>
+          <a:chOff x="0" y="0"/>
+          <a:chExt cx="0" cy="0"/>
+        </a:xfrm>
+      </p:grpSpPr>
+      <p:sp>
+        <p:nvSpPr>
+          <p:cNvPr id="2" name="Title 1"/>
+          <p:cNvSpPr>
+            <a:spLocks noGrp="1"/>
+          </p:cNvSpPr>
+          <p:nvPr>
+            <p:ph type="title"/>
+          </p:nvPr>
+        </p:nvSpPr>
+        <p:spPr/>
+        <p:txBody>
+          <a:bodyPr/>
+          <a:lstStyle/>
+          <a:p>
+            <a:pPr lvl="0" marL="0" indent="0">
+              <a:buNone/>
+            </a:pPr>
+            <a:r>
+              <a:rPr/>
+              <a:t>Analysis</a:t>
+            </a:r>
+          </a:p>
+        </p:txBody>
+      </p:sp>
+      <p:sp>
+        <p:nvSpPr>
+          <p:cNvPr id="3" name="Content Placeholder 2"/>
+          <p:cNvSpPr>
+            <a:spLocks noGrp="1"/>
+          </p:cNvSpPr>
+          <p:nvPr>
+            <p:ph idx="1"/>
+          </p:nvPr>
+        </p:nvSpPr>
+        <p:spPr/>
+        <p:txBody>
+          <a:bodyPr/>
+          <a:lstStyle/>
+          <a:p>
+            <a:pPr lvl="1"/>
+            <a:r>
+              <a:rPr/>
+              <a:t>Statistical model</a:t>
+            </a:r>
+          </a:p>
+          <a:p>
+            <a:pPr lvl="1"/>
+            <a:r>
+              <a:rPr/>
+              <a:t>Adjustments for multiplicity</a:t>
+            </a:r>
+          </a:p>
+          <a:p>
+            <a:pPr lvl="1"/>
+            <a:r>
+              <a:rPr/>
+              <a:t>Handling missing values/dropout</a:t>
+            </a:r>
+          </a:p>
+          <a:p>
+            <a:pPr lvl="1"/>
+            <a:r>
+              <a:rPr/>
+              <a:t>Alpha level and one/two sided tests</a:t>
+            </a:r>
+          </a:p>
+          <a:p>
+            <a:pPr lvl="2"/>
+            <a:r>
+              <a:rPr/>
+              <a:t>Boilerplate: “All tests were two sided, and P values below the 5% level were regarded as significant.” Lokken 1995.</a:t>
+            </a:r>
+          </a:p>
+        </p:txBody>
+      </p:sp>
+    </p:spTree>
+  </p:cSld>
+</p:sld>
+</file>
+
+<file path=ppt/slides/slide33.xml><?xml version="1.0" encoding="utf-8"?>
+<p:sld xmlns:a="http://schemas.openxmlformats.org/drawingml/2006/main" xmlns:r="http://schemas.openxmlformats.org/officeDocument/2006/relationships" xmlns:p="http://schemas.openxmlformats.org/presentationml/2006/main">
+  <p:cSld>
+    <p:spTree>
+      <p:nvGrpSpPr>
+        <p:cNvPr id="1" name=""/>
+        <p:cNvGrpSpPr/>
+        <p:nvPr/>
+      </p:nvGrpSpPr>
+      <p:grpSpPr>
+        <a:xfrm>
+          <a:off x="0" y="0"/>
+          <a:ext cx="0" cy="0"/>
+          <a:chOff x="0" y="0"/>
+          <a:chExt cx="0" cy="0"/>
+        </a:xfrm>
+      </p:grpSpPr>
+      <p:sp>
+        <p:nvSpPr>
+          <p:cNvPr id="2" name="Title 1"/>
+          <p:cNvSpPr>
+            <a:spLocks noGrp="1"/>
+          </p:cNvSpPr>
+          <p:nvPr>
+            <p:ph type="title"/>
+          </p:nvPr>
+        </p:nvSpPr>
+        <p:spPr/>
+        <p:txBody>
+          <a:bodyPr/>
+          <a:lstStyle/>
+          <a:p>
+            <a:pPr lvl="0" marL="0" indent="0">
+              <a:buNone/>
+            </a:pPr>
+            <a:r>
+              <a:rPr/>
+              <a:t>What</a:t>
+            </a:r>
+            <a:r>
+              <a:rPr/>
+              <a:t> </a:t>
+            </a:r>
+            <a:r>
+              <a:rPr/>
+              <a:t>goes</a:t>
+            </a:r>
+            <a:r>
+              <a:rPr/>
+              <a:t> </a:t>
+            </a:r>
+            <a:r>
+              <a:rPr/>
+              <a:t>in</a:t>
+            </a:r>
+            <a:r>
+              <a:rPr/>
+              <a:t> </a:t>
+            </a:r>
+            <a:r>
+              <a:rPr/>
+              <a:t>the</a:t>
+            </a:r>
+            <a:r>
+              <a:rPr/>
+              <a:t> </a:t>
+            </a:r>
+            <a:r>
+              <a:rPr/>
+              <a:t>methods</a:t>
+            </a:r>
+            <a:r>
+              <a:rPr/>
+              <a:t> </a:t>
+            </a:r>
+            <a:r>
+              <a:rPr/>
+              <a:t>section</a:t>
+            </a:r>
+            <a:r>
+              <a:rPr/>
+              <a:t> </a:t>
+            </a:r>
+            <a:r>
+              <a:rPr/>
+              <a:t>of</a:t>
+            </a:r>
+            <a:r>
+              <a:rPr/>
+              <a:t> </a:t>
+            </a:r>
+            <a:r>
+              <a:rPr/>
+              <a:t>a</a:t>
+            </a:r>
+            <a:r>
+              <a:rPr/>
+              <a:t> </a:t>
+            </a:r>
+            <a:r>
+              <a:rPr/>
+              <a:t>qualitative</a:t>
+            </a:r>
+            <a:r>
+              <a:rPr/>
+              <a:t> </a:t>
+            </a:r>
+            <a:r>
+              <a:rPr/>
+              <a:t>study</a:t>
+            </a:r>
+          </a:p>
+        </p:txBody>
+      </p:sp>
+      <p:sp>
+        <p:nvSpPr>
+          <p:cNvPr id="3" name="Content Placeholder 2"/>
+          <p:cNvSpPr>
+            <a:spLocks noGrp="1"/>
+          </p:cNvSpPr>
+          <p:nvPr>
+            <p:ph idx="1"/>
+          </p:nvPr>
+        </p:nvSpPr>
+        <p:spPr/>
+        <p:txBody>
+          <a:bodyPr/>
+          <a:lstStyle/>
+          <a:p>
+            <a:pPr lvl="1"/>
+            <a:r>
+              <a:rPr/>
+              <a:t>Recruitment process</a:t>
+            </a:r>
+          </a:p>
+          <a:p>
+            <a:pPr lvl="1"/>
+            <a:r>
+              <a:rPr/>
+              <a:t>Structure of the interview/focus group</a:t>
+            </a:r>
+          </a:p>
+          <a:p>
+            <a:pPr lvl="1"/>
+            <a:r>
+              <a:rPr/>
+              <a:t>Recording and transcription details</a:t>
+            </a:r>
+          </a:p>
+          <a:p>
+            <a:pPr lvl="1"/>
+            <a:r>
+              <a:rPr/>
+              <a:t>SoftWare used to create categories</a:t>
+            </a:r>
+          </a:p>
+          <a:p>
+            <a:pPr lvl="1"/>
+            <a:r>
+              <a:rPr/>
+              <a:t>Process to insure reliability</a:t>
+            </a:r>
+          </a:p>
+          <a:p>
+            <a:pPr lvl="2"/>
+            <a:r>
+              <a:rPr/>
+              <a:t>Multiple raters</a:t>
+            </a:r>
+          </a:p>
+          <a:p>
+            <a:pPr lvl="2"/>
+            <a:r>
+              <a:rPr/>
+              <a:t>Adjudication of disagreement</a:t>
+            </a:r>
+          </a:p>
+          <a:p>
+            <a:pPr lvl="2"/>
+            <a:r>
+              <a:rPr/>
+              <a:t>Other audits</a:t>
+            </a:r>
+          </a:p>
+        </p:txBody>
+      </p:sp>
+    </p:spTree>
+  </p:cSld>
+</p:sld>
+</file>
+
+<file path=ppt/slides/slide34.xml><?xml version="1.0" encoding="utf-8"?>
+<p:sld xmlns:a="http://schemas.openxmlformats.org/drawingml/2006/main" xmlns:r="http://schemas.openxmlformats.org/officeDocument/2006/relationships" xmlns:p="http://schemas.openxmlformats.org/presentationml/2006/main">
+  <p:cSld>
+    <p:spTree>
+      <p:nvGrpSpPr>
+        <p:cNvPr id="1" name=""/>
+        <p:cNvGrpSpPr/>
+        <p:nvPr/>
+      </p:nvGrpSpPr>
+      <p:grpSpPr>
+        <a:xfrm>
+          <a:off x="0" y="0"/>
+          <a:ext cx="0" cy="0"/>
+          <a:chOff x="0" y="0"/>
+          <a:chExt cx="0" cy="0"/>
+        </a:xfrm>
+      </p:grpSpPr>
+      <p:sp>
+        <p:nvSpPr>
+          <p:cNvPr id="2" name="Title 1"/>
+          <p:cNvSpPr>
+            <a:spLocks noGrp="1"/>
+          </p:cNvSpPr>
+          <p:nvPr>
+            <p:ph type="title"/>
+          </p:nvPr>
+        </p:nvSpPr>
+        <p:spPr/>
+        <p:txBody>
+          <a:bodyPr/>
+          <a:lstStyle/>
+          <a:p>
+            <a:pPr lvl="0" marL="0" indent="0">
+              <a:buNone/>
+            </a:pPr>
+            <a:r>
+              <a:rPr/>
+              <a:t>Conclusion</a:t>
+            </a:r>
+          </a:p>
+        </p:txBody>
+      </p:sp>
+      <p:sp>
+        <p:nvSpPr>
+          <p:cNvPr id="3" name="Content Placeholder 2"/>
+          <p:cNvSpPr>
+            <a:spLocks noGrp="1"/>
+          </p:cNvSpPr>
+          <p:nvPr>
+            <p:ph idx="1"/>
+          </p:nvPr>
+        </p:nvSpPr>
+        <p:spPr/>
+        <p:txBody>
+          <a:bodyPr/>
+          <a:lstStyle/>
+          <a:p>
+            <a:pPr lvl="1"/>
+            <a:r>
+              <a:rPr/>
+              <a:t>What have you learned?</a:t>
+            </a:r>
+          </a:p>
+          <a:p>
+            <a:pPr lvl="2"/>
+            <a:r>
+              <a:rPr/>
+              <a:t>Types of probability samples</a:t>
+            </a:r>
+          </a:p>
+          <a:p>
+            <a:pPr lvl="2"/>
+            <a:r>
+              <a:rPr/>
+              <a:t>How to draw a random sample</a:t>
+            </a:r>
+          </a:p>
+          <a:p>
+            <a:pPr lvl="2"/>
+            <a:r>
+              <a:rPr/>
+              <a:t>Different types of non-probability samples</a:t>
+            </a:r>
+          </a:p>
+          <a:p>
+            <a:pPr lvl="2"/>
+            <a:r>
+              <a:rPr/>
+              <a:t>How to allocate treatments randomly</a:t>
             </a:r>
           </a:p>
         </p:txBody>

</xml_diff>